<commit_message>
prob with an ending 0
</commit_message>
<xml_diff>
--- a/plots/prob_dist.pptx
+++ b/plots/prob_dist.pptx
@@ -5,11 +5,14 @@
     <p:sldMasterId id="2147483648" r:id="rId1"/>
   </p:sldMasterIdLst>
   <p:sldIdLst>
-    <p:sldId id="257" r:id="rId2"/>
-    <p:sldId id="258" r:id="rId3"/>
-    <p:sldId id="259" r:id="rId4"/>
-    <p:sldId id="260" r:id="rId5"/>
-    <p:sldId id="261" r:id="rId6"/>
+    <p:sldId id="262" r:id="rId2"/>
+    <p:sldId id="263" r:id="rId3"/>
+    <p:sldId id="258" r:id="rId4"/>
+    <p:sldId id="264" r:id="rId5"/>
+    <p:sldId id="259" r:id="rId6"/>
+    <p:sldId id="260" r:id="rId7"/>
+    <p:sldId id="261" r:id="rId8"/>
+    <p:sldId id="265" r:id="rId9"/>
   </p:sldIdLst>
   <p:sldSz cx="12192000" cy="6858000"/>
   <p:notesSz cx="6858000" cy="9144000"/>
@@ -108,6 +111,11 @@
       </a:defRPr>
     </a:lvl9pPr>
   </p:defaultTextStyle>
+  <p:extLst>
+    <p:ext uri="{EFAFB233-063F-42B5-8137-9DF3F51BA10A}">
+      <p15:sldGuideLst xmlns:p15="http://schemas.microsoft.com/office/powerpoint/2012/main"/>
+    </p:ext>
+  </p:extLst>
 </p:presentation>
 </file>
 
@@ -3330,7 +3338,7 @@
           <p:cNvPr id="2" name="Object 1">
             <a:extLst>
               <a:ext uri="{FF2B5EF4-FFF2-40B4-BE49-F238E27FC236}">
-                <a16:creationId xmlns:a16="http://schemas.microsoft.com/office/drawing/2014/main" id="{D8DBEC15-15F3-4D81-9F6F-881734C9182A}"/>
+                <a16:creationId xmlns:a16="http://schemas.microsoft.com/office/drawing/2014/main" id="{187188B7-9B9B-4351-A9ED-7809E339F329}"/>
               </a:ext>
             </a:extLst>
           </p:cNvPr>
@@ -3340,7 +3348,7 @@
           <p:nvPr>
             <p:extLst>
               <p:ext uri="{D42A27DB-BD31-4B8C-83A1-F6EECF244321}">
-                <p14:modId xmlns:p14="http://schemas.microsoft.com/office/powerpoint/2010/main" val="969450148"/>
+                <p14:modId xmlns:p14="http://schemas.microsoft.com/office/powerpoint/2010/main" val="942623345"/>
               </p:ext>
             </p:extLst>
           </p:nvPr>
@@ -3353,7 +3361,7 @@
           <a:graphicData uri="http://schemas.openxmlformats.org/presentationml/2006/ole">
             <mc:AlternateContent xmlns:mc="http://schemas.openxmlformats.org/markup-compatibility/2006">
               <mc:Choice xmlns:v="urn:schemas-microsoft-com:vml" Requires="v">
-                <p:oleObj spid="_x0000_s1038" name="Acrobat Document" r:id="rId3" imgW="4390885" imgH="3276600" progId="AcroExch.Document.DC">
+                <p:oleObj spid="_x0000_s6154" name="Acrobat Document" r:id="rId3" imgW="4390885" imgH="3276600" progId="AcroExch.Document.DC">
                   <p:embed/>
                 </p:oleObj>
               </mc:Choice>
@@ -3362,7 +3370,13 @@
                   <p:embed/>
                   <p:pic>
                     <p:nvPicPr>
-                      <p:cNvPr id="0" name=""/>
+                      <p:cNvPr id="2" name="Object 1">
+                        <a:extLst>
+                          <a:ext uri="{FF2B5EF4-FFF2-40B4-BE49-F238E27FC236}">
+                            <a16:creationId xmlns:a16="http://schemas.microsoft.com/office/drawing/2014/main" id="{D8DBEC15-15F3-4D81-9F6F-881734C9182A}"/>
+                          </a:ext>
+                        </a:extLst>
+                      </p:cNvPr>
                       <p:cNvPicPr/>
                       <p:nvPr/>
                     </p:nvPicPr>
@@ -3393,7 +3407,7 @@
           <p:cNvPr id="3" name="Object 2">
             <a:extLst>
               <a:ext uri="{FF2B5EF4-FFF2-40B4-BE49-F238E27FC236}">
-                <a16:creationId xmlns:a16="http://schemas.microsoft.com/office/drawing/2014/main" id="{AE201C4E-9F7A-4D57-B293-C466D5554C89}"/>
+                <a16:creationId xmlns:a16="http://schemas.microsoft.com/office/drawing/2014/main" id="{3741434C-59F4-48CC-9F8A-9D245370EA71}"/>
               </a:ext>
             </a:extLst>
           </p:cNvPr>
@@ -3403,20 +3417,20 @@
           <p:nvPr>
             <p:extLst>
               <p:ext uri="{D42A27DB-BD31-4B8C-83A1-F6EECF244321}">
-                <p14:modId xmlns:p14="http://schemas.microsoft.com/office/powerpoint/2010/main" val="3728229055"/>
+                <p14:modId xmlns:p14="http://schemas.microsoft.com/office/powerpoint/2010/main" val="3807270331"/>
               </p:ext>
             </p:extLst>
           </p:nvPr>
         </p:nvGraphicFramePr>
         <p:xfrm>
-          <a:off x="-1" y="3429000"/>
+          <a:off x="4016828" y="152400"/>
           <a:ext cx="4391025" cy="3276600"/>
         </p:xfrm>
         <a:graphic>
           <a:graphicData uri="http://schemas.openxmlformats.org/presentationml/2006/ole">
             <mc:AlternateContent xmlns:mc="http://schemas.openxmlformats.org/markup-compatibility/2006">
               <mc:Choice xmlns:v="urn:schemas-microsoft-com:vml" Requires="v">
-                <p:oleObj spid="_x0000_s1039" name="Acrobat Document" r:id="rId5" imgW="4390885" imgH="3276600" progId="AcroExch.Document.DC">
+                <p:oleObj spid="_x0000_s6155" name="Acrobat Document" r:id="rId5" imgW="4390885" imgH="3276600" progId="AcroExch.Document.DC">
                   <p:embed/>
                 </p:oleObj>
               </mc:Choice>
@@ -3425,7 +3439,13 @@
                   <p:embed/>
                   <p:pic>
                     <p:nvPicPr>
-                      <p:cNvPr id="0" name=""/>
+                      <p:cNvPr id="3" name="Object 2">
+                        <a:extLst>
+                          <a:ext uri="{FF2B5EF4-FFF2-40B4-BE49-F238E27FC236}">
+                            <a16:creationId xmlns:a16="http://schemas.microsoft.com/office/drawing/2014/main" id="{AE201C4E-9F7A-4D57-B293-C466D5554C89}"/>
+                          </a:ext>
+                        </a:extLst>
+                      </p:cNvPr>
                       <p:cNvPicPr/>
                       <p:nvPr/>
                     </p:nvPicPr>
@@ -3437,7 +3457,7 @@
                     </p:blipFill>
                     <p:spPr>
                       <a:xfrm>
-                        <a:off x="-1" y="3429000"/>
+                        <a:off x="4016828" y="152400"/>
                         <a:ext cx="4391025" cy="3276600"/>
                       </a:xfrm>
                       <a:prstGeom prst="rect">
@@ -3456,7 +3476,7 @@
           <p:cNvPr id="4" name="Object 3">
             <a:extLst>
               <a:ext uri="{FF2B5EF4-FFF2-40B4-BE49-F238E27FC236}">
-                <a16:creationId xmlns:a16="http://schemas.microsoft.com/office/drawing/2014/main" id="{8CA34ACE-D6B7-48C2-9C21-2A9E36A2C962}"/>
+                <a16:creationId xmlns:a16="http://schemas.microsoft.com/office/drawing/2014/main" id="{F6F53187-E99E-464D-8DD3-2704F7A51AF4}"/>
               </a:ext>
             </a:extLst>
           </p:cNvPr>
@@ -3466,20 +3486,20 @@
           <p:nvPr>
             <p:extLst>
               <p:ext uri="{D42A27DB-BD31-4B8C-83A1-F6EECF244321}">
-                <p14:modId xmlns:p14="http://schemas.microsoft.com/office/powerpoint/2010/main" val="2545792399"/>
+                <p14:modId xmlns:p14="http://schemas.microsoft.com/office/powerpoint/2010/main" val="543610867"/>
               </p:ext>
             </p:extLst>
           </p:nvPr>
         </p:nvGraphicFramePr>
         <p:xfrm>
-          <a:off x="4038373" y="152400"/>
+          <a:off x="8033656" y="152400"/>
           <a:ext cx="4391025" cy="3276600"/>
         </p:xfrm>
         <a:graphic>
           <a:graphicData uri="http://schemas.openxmlformats.org/presentationml/2006/ole">
             <mc:AlternateContent xmlns:mc="http://schemas.openxmlformats.org/markup-compatibility/2006">
               <mc:Choice xmlns:v="urn:schemas-microsoft-com:vml" Requires="v">
-                <p:oleObj spid="_x0000_s1040" name="Acrobat Document" r:id="rId7" imgW="4390885" imgH="3276600" progId="AcroExch.Document.DC">
+                <p:oleObj spid="_x0000_s6156" name="Acrobat Document" r:id="rId7" imgW="4390885" imgH="3276600" progId="AcroExch.Document.DC">
                   <p:embed/>
                 </p:oleObj>
               </mc:Choice>
@@ -3500,7 +3520,7 @@
                     </p:blipFill>
                     <p:spPr>
                       <a:xfrm>
-                        <a:off x="4038373" y="152400"/>
+                        <a:off x="8033656" y="152400"/>
                         <a:ext cx="4391025" cy="3276600"/>
                       </a:xfrm>
                       <a:prstGeom prst="rect">
@@ -3519,7 +3539,7 @@
           <p:cNvPr id="5" name="Object 4">
             <a:extLst>
               <a:ext uri="{FF2B5EF4-FFF2-40B4-BE49-F238E27FC236}">
-                <a16:creationId xmlns:a16="http://schemas.microsoft.com/office/drawing/2014/main" id="{6174A989-4FA2-4452-A29C-58778321FD97}"/>
+                <a16:creationId xmlns:a16="http://schemas.microsoft.com/office/drawing/2014/main" id="{246E5876-89E4-45D3-B352-92F2D67E63DA}"/>
               </a:ext>
             </a:extLst>
           </p:cNvPr>
@@ -3529,7 +3549,76 @@
           <p:nvPr>
             <p:extLst>
               <p:ext uri="{D42A27DB-BD31-4B8C-83A1-F6EECF244321}">
-                <p14:modId xmlns:p14="http://schemas.microsoft.com/office/powerpoint/2010/main" val="2206623399"/>
+                <p14:modId xmlns:p14="http://schemas.microsoft.com/office/powerpoint/2010/main" val="728192130"/>
+              </p:ext>
+            </p:extLst>
+          </p:nvPr>
+        </p:nvGraphicFramePr>
+        <p:xfrm>
+          <a:off x="0" y="3429000"/>
+          <a:ext cx="4391025" cy="3276600"/>
+        </p:xfrm>
+        <a:graphic>
+          <a:graphicData uri="http://schemas.openxmlformats.org/presentationml/2006/ole">
+            <mc:AlternateContent xmlns:mc="http://schemas.openxmlformats.org/markup-compatibility/2006">
+              <mc:Choice xmlns:v="urn:schemas-microsoft-com:vml" Requires="v">
+                <p:oleObj spid="_x0000_s6157" name="Acrobat Document" r:id="rId9" imgW="4390885" imgH="3276600" progId="AcroExch.Document.DC">
+                  <p:embed/>
+                </p:oleObj>
+              </mc:Choice>
+              <mc:Fallback>
+                <p:oleObj name="Acrobat Document" r:id="rId9" imgW="4390885" imgH="3276600" progId="AcroExch.Document.DC">
+                  <p:embed/>
+                  <p:pic>
+                    <p:nvPicPr>
+                      <p:cNvPr id="4" name="Object 3">
+                        <a:extLst>
+                          <a:ext uri="{FF2B5EF4-FFF2-40B4-BE49-F238E27FC236}">
+                            <a16:creationId xmlns:a16="http://schemas.microsoft.com/office/drawing/2014/main" id="{8CA34ACE-D6B7-48C2-9C21-2A9E36A2C962}"/>
+                          </a:ext>
+                        </a:extLst>
+                      </p:cNvPr>
+                      <p:cNvPicPr/>
+                      <p:nvPr/>
+                    </p:nvPicPr>
+                    <p:blipFill>
+                      <a:blip r:embed="rId10"/>
+                      <a:stretch>
+                        <a:fillRect/>
+                      </a:stretch>
+                    </p:blipFill>
+                    <p:spPr>
+                      <a:xfrm>
+                        <a:off x="0" y="3429000"/>
+                        <a:ext cx="4391025" cy="3276600"/>
+                      </a:xfrm>
+                      <a:prstGeom prst="rect">
+                        <a:avLst/>
+                      </a:prstGeom>
+                    </p:spPr>
+                  </p:pic>
+                </p:oleObj>
+              </mc:Fallback>
+            </mc:AlternateContent>
+          </a:graphicData>
+        </a:graphic>
+      </p:graphicFrame>
+      <p:graphicFrame>
+        <p:nvGraphicFramePr>
+          <p:cNvPr id="6" name="Object 5">
+            <a:extLst>
+              <a:ext uri="{FF2B5EF4-FFF2-40B4-BE49-F238E27FC236}">
+                <a16:creationId xmlns:a16="http://schemas.microsoft.com/office/drawing/2014/main" id="{023DA792-64A7-47AB-9313-02DE1A50C540}"/>
+              </a:ext>
+            </a:extLst>
+          </p:cNvPr>
+          <p:cNvGraphicFramePr>
+            <a:graphicFrameLocks noChangeAspect="1"/>
+          </p:cNvGraphicFramePr>
+          <p:nvPr>
+            <p:extLst>
+              <p:ext uri="{D42A27DB-BD31-4B8C-83A1-F6EECF244321}">
+                <p14:modId xmlns:p14="http://schemas.microsoft.com/office/powerpoint/2010/main" val="2088425089"/>
               </p:ext>
             </p:extLst>
           </p:nvPr>
@@ -3542,21 +3631,27 @@
           <a:graphicData uri="http://schemas.openxmlformats.org/presentationml/2006/ole">
             <mc:AlternateContent xmlns:mc="http://schemas.openxmlformats.org/markup-compatibility/2006">
               <mc:Choice xmlns:v="urn:schemas-microsoft-com:vml" Requires="v">
-                <p:oleObj spid="_x0000_s1041" name="Acrobat Document" r:id="rId9" imgW="4390885" imgH="3276600" progId="AcroExch.Document.DC">
+                <p:oleObj spid="_x0000_s6158" name="Acrobat Document" r:id="rId11" imgW="4390885" imgH="3276600" progId="AcroExch.Document.DC">
                   <p:embed/>
                 </p:oleObj>
               </mc:Choice>
               <mc:Fallback>
-                <p:oleObj name="Acrobat Document" r:id="rId9" imgW="4390885" imgH="3276600" progId="AcroExch.Document.DC">
+                <p:oleObj name="Acrobat Document" r:id="rId11" imgW="4390885" imgH="3276600" progId="AcroExch.Document.DC">
                   <p:embed/>
                   <p:pic>
                     <p:nvPicPr>
-                      <p:cNvPr id="0" name=""/>
+                      <p:cNvPr id="5" name="Object 4">
+                        <a:extLst>
+                          <a:ext uri="{FF2B5EF4-FFF2-40B4-BE49-F238E27FC236}">
+                            <a16:creationId xmlns:a16="http://schemas.microsoft.com/office/drawing/2014/main" id="{6174A989-4FA2-4452-A29C-58778321FD97}"/>
+                          </a:ext>
+                        </a:extLst>
+                      </p:cNvPr>
                       <p:cNvPicPr/>
                       <p:nvPr/>
                     </p:nvPicPr>
                     <p:blipFill>
-                      <a:blip r:embed="rId10"/>
+                      <a:blip r:embed="rId12"/>
                       <a:stretch>
                         <a:fillRect/>
                       </a:stretch>
@@ -3579,10 +3674,10 @@
       </p:graphicFrame>
       <p:graphicFrame>
         <p:nvGraphicFramePr>
-          <p:cNvPr id="6" name="Object 5">
-            <a:extLst>
-              <a:ext uri="{FF2B5EF4-FFF2-40B4-BE49-F238E27FC236}">
-                <a16:creationId xmlns:a16="http://schemas.microsoft.com/office/drawing/2014/main" id="{D70BA0AE-1125-4CA7-A366-2BF40D97710B}"/>
+          <p:cNvPr id="7" name="Object 6">
+            <a:extLst>
+              <a:ext uri="{FF2B5EF4-FFF2-40B4-BE49-F238E27FC236}">
+                <a16:creationId xmlns:a16="http://schemas.microsoft.com/office/drawing/2014/main" id="{6FB079D8-7E84-4F63-898C-5504D23C3B0A}"/>
               </a:ext>
             </a:extLst>
           </p:cNvPr>
@@ -3592,83 +3687,20 @@
           <p:nvPr>
             <p:extLst>
               <p:ext uri="{D42A27DB-BD31-4B8C-83A1-F6EECF244321}">
-                <p14:modId xmlns:p14="http://schemas.microsoft.com/office/powerpoint/2010/main" val="1291930657"/>
+                <p14:modId xmlns:p14="http://schemas.microsoft.com/office/powerpoint/2010/main" val="1810712073"/>
               </p:ext>
             </p:extLst>
           </p:nvPr>
         </p:nvGraphicFramePr>
         <p:xfrm>
-          <a:off x="7987875" y="152400"/>
+          <a:off x="8033655" y="3429000"/>
           <a:ext cx="4391025" cy="3276600"/>
         </p:xfrm>
         <a:graphic>
           <a:graphicData uri="http://schemas.openxmlformats.org/presentationml/2006/ole">
             <mc:AlternateContent xmlns:mc="http://schemas.openxmlformats.org/markup-compatibility/2006">
               <mc:Choice xmlns:v="urn:schemas-microsoft-com:vml" Requires="v">
-                <p:oleObj spid="_x0000_s1042" name="Acrobat Document" r:id="rId11" imgW="4390885" imgH="3276600" progId="AcroExch.Document.DC">
-                  <p:embed/>
-                </p:oleObj>
-              </mc:Choice>
-              <mc:Fallback>
-                <p:oleObj name="Acrobat Document" r:id="rId11" imgW="4390885" imgH="3276600" progId="AcroExch.Document.DC">
-                  <p:embed/>
-                  <p:pic>
-                    <p:nvPicPr>
-                      <p:cNvPr id="0" name=""/>
-                      <p:cNvPicPr/>
-                      <p:nvPr/>
-                    </p:nvPicPr>
-                    <p:blipFill>
-                      <a:blip r:embed="rId12"/>
-                      <a:stretch>
-                        <a:fillRect/>
-                      </a:stretch>
-                    </p:blipFill>
-                    <p:spPr>
-                      <a:xfrm>
-                        <a:off x="7987875" y="152400"/>
-                        <a:ext cx="4391025" cy="3276600"/>
-                      </a:xfrm>
-                      <a:prstGeom prst="rect">
-                        <a:avLst/>
-                      </a:prstGeom>
-                    </p:spPr>
-                  </p:pic>
-                </p:oleObj>
-              </mc:Fallback>
-            </mc:AlternateContent>
-          </a:graphicData>
-        </a:graphic>
-      </p:graphicFrame>
-      <p:graphicFrame>
-        <p:nvGraphicFramePr>
-          <p:cNvPr id="7" name="Object 6">
-            <a:extLst>
-              <a:ext uri="{FF2B5EF4-FFF2-40B4-BE49-F238E27FC236}">
-                <a16:creationId xmlns:a16="http://schemas.microsoft.com/office/drawing/2014/main" id="{2F4EDA7A-9DE3-4095-A6C3-841C3525EBDA}"/>
-              </a:ext>
-            </a:extLst>
-          </p:cNvPr>
-          <p:cNvGraphicFramePr>
-            <a:graphicFrameLocks noChangeAspect="1"/>
-          </p:cNvGraphicFramePr>
-          <p:nvPr>
-            <p:extLst>
-              <p:ext uri="{D42A27DB-BD31-4B8C-83A1-F6EECF244321}">
-                <p14:modId xmlns:p14="http://schemas.microsoft.com/office/powerpoint/2010/main" val="2092590329"/>
-              </p:ext>
-            </p:extLst>
-          </p:nvPr>
-        </p:nvGraphicFramePr>
-        <p:xfrm>
-          <a:off x="7987875" y="3429000"/>
-          <a:ext cx="4391025" cy="3276600"/>
-        </p:xfrm>
-        <a:graphic>
-          <a:graphicData uri="http://schemas.openxmlformats.org/presentationml/2006/ole">
-            <mc:AlternateContent xmlns:mc="http://schemas.openxmlformats.org/markup-compatibility/2006">
-              <mc:Choice xmlns:v="urn:schemas-microsoft-com:vml" Requires="v">
-                <p:oleObj spid="_x0000_s1043" name="Acrobat Document" r:id="rId13" imgW="4390885" imgH="3276600" progId="AcroExch.Document.DC">
+                <p:oleObj spid="_x0000_s6159" name="Acrobat Document" r:id="rId13" imgW="4390885" imgH="3276600" progId="AcroExch.Document.DC">
                   <p:embed/>
                 </p:oleObj>
               </mc:Choice>
@@ -3689,7 +3721,7 @@
                     </p:blipFill>
                     <p:spPr>
                       <a:xfrm>
-                        <a:off x="7987875" y="3429000"/>
+                        <a:off x="8033655" y="3429000"/>
                         <a:ext cx="4391025" cy="3276600"/>
                       </a:xfrm>
                       <a:prstGeom prst="rect">
@@ -3706,7 +3738,7 @@
     </p:spTree>
     <p:extLst>
       <p:ext uri="{BB962C8B-B14F-4D97-AF65-F5344CB8AC3E}">
-        <p14:creationId xmlns:p14="http://schemas.microsoft.com/office/powerpoint/2010/main" val="2014865680"/>
+        <p14:creationId xmlns:p14="http://schemas.microsoft.com/office/powerpoint/2010/main" val="4198894583"/>
       </p:ext>
     </p:extLst>
   </p:cSld>
@@ -3738,7 +3770,7 @@
           <p:cNvPr id="2" name="Object 1">
             <a:extLst>
               <a:ext uri="{FF2B5EF4-FFF2-40B4-BE49-F238E27FC236}">
-                <a16:creationId xmlns:a16="http://schemas.microsoft.com/office/drawing/2014/main" id="{23A7F9BE-ED83-4929-B77C-DD92ECBE5F19}"/>
+                <a16:creationId xmlns:a16="http://schemas.microsoft.com/office/drawing/2014/main" id="{1BF7AE73-DEBE-40B6-A445-BDEAB751574E}"/>
               </a:ext>
             </a:extLst>
           </p:cNvPr>
@@ -3748,7 +3780,7 @@
           <p:nvPr>
             <p:extLst>
               <p:ext uri="{D42A27DB-BD31-4B8C-83A1-F6EECF244321}">
-                <p14:modId xmlns:p14="http://schemas.microsoft.com/office/powerpoint/2010/main" val="4103810515"/>
+                <p14:modId xmlns:p14="http://schemas.microsoft.com/office/powerpoint/2010/main" val="2518668795"/>
               </p:ext>
             </p:extLst>
           </p:nvPr>
@@ -3761,7 +3793,7 @@
           <a:graphicData uri="http://schemas.openxmlformats.org/presentationml/2006/ole">
             <mc:AlternateContent xmlns:mc="http://schemas.openxmlformats.org/markup-compatibility/2006">
               <mc:Choice xmlns:v="urn:schemas-microsoft-com:vml" Requires="v">
-                <p:oleObj spid="_x0000_s2062" name="Acrobat Document" r:id="rId3" imgW="4390885" imgH="3276600" progId="AcroExch.Document.DC">
+                <p:oleObj spid="_x0000_s7176" name="Acrobat Document" r:id="rId3" imgW="4390885" imgH="3276600" progId="AcroExch.Document.DC">
                   <p:embed/>
                 </p:oleObj>
               </mc:Choice>
@@ -3770,7 +3802,13 @@
                   <p:embed/>
                   <p:pic>
                     <p:nvPicPr>
-                      <p:cNvPr id="0" name=""/>
+                      <p:cNvPr id="6" name="Object 5">
+                        <a:extLst>
+                          <a:ext uri="{FF2B5EF4-FFF2-40B4-BE49-F238E27FC236}">
+                            <a16:creationId xmlns:a16="http://schemas.microsoft.com/office/drawing/2014/main" id="{D70BA0AE-1125-4CA7-A366-2BF40D97710B}"/>
+                          </a:ext>
+                        </a:extLst>
+                      </p:cNvPr>
                       <p:cNvPicPr/>
                       <p:nvPr/>
                     </p:nvPicPr>
@@ -3801,7 +3839,7 @@
           <p:cNvPr id="3" name="Object 2">
             <a:extLst>
               <a:ext uri="{FF2B5EF4-FFF2-40B4-BE49-F238E27FC236}">
-                <a16:creationId xmlns:a16="http://schemas.microsoft.com/office/drawing/2014/main" id="{8D2D4425-61AF-4CCF-8A72-2F6784618CBB}"/>
+                <a16:creationId xmlns:a16="http://schemas.microsoft.com/office/drawing/2014/main" id="{139098A0-08D5-4CD3-8AB7-18FAEBDE8D54}"/>
               </a:ext>
             </a:extLst>
           </p:cNvPr>
@@ -3811,20 +3849,20 @@
           <p:nvPr>
             <p:extLst>
               <p:ext uri="{D42A27DB-BD31-4B8C-83A1-F6EECF244321}">
-                <p14:modId xmlns:p14="http://schemas.microsoft.com/office/powerpoint/2010/main" val="2068412173"/>
+                <p14:modId xmlns:p14="http://schemas.microsoft.com/office/powerpoint/2010/main" val="3157151975"/>
               </p:ext>
             </p:extLst>
           </p:nvPr>
         </p:nvGraphicFramePr>
         <p:xfrm>
-          <a:off x="0" y="3276600"/>
+          <a:off x="3995057" y="0"/>
           <a:ext cx="4391025" cy="3276600"/>
         </p:xfrm>
         <a:graphic>
           <a:graphicData uri="http://schemas.openxmlformats.org/presentationml/2006/ole">
             <mc:AlternateContent xmlns:mc="http://schemas.openxmlformats.org/markup-compatibility/2006">
               <mc:Choice xmlns:v="urn:schemas-microsoft-com:vml" Requires="v">
-                <p:oleObj spid="_x0000_s2063" name="Acrobat Document" r:id="rId5" imgW="4390885" imgH="3276600" progId="AcroExch.Document.DC">
+                <p:oleObj spid="_x0000_s7177" name="Acrobat Document" r:id="rId5" imgW="4390885" imgH="3276600" progId="AcroExch.Document.DC">
                   <p:embed/>
                 </p:oleObj>
               </mc:Choice>
@@ -3833,7 +3871,13 @@
                   <p:embed/>
                   <p:pic>
                     <p:nvPicPr>
-                      <p:cNvPr id="0" name=""/>
+                      <p:cNvPr id="7" name="Object 6">
+                        <a:extLst>
+                          <a:ext uri="{FF2B5EF4-FFF2-40B4-BE49-F238E27FC236}">
+                            <a16:creationId xmlns:a16="http://schemas.microsoft.com/office/drawing/2014/main" id="{2F4EDA7A-9DE3-4095-A6C3-841C3525EBDA}"/>
+                          </a:ext>
+                        </a:extLst>
+                      </p:cNvPr>
                       <p:cNvPicPr/>
                       <p:nvPr/>
                     </p:nvPicPr>
@@ -3845,7 +3889,7 @@
                     </p:blipFill>
                     <p:spPr>
                       <a:xfrm>
-                        <a:off x="0" y="3276600"/>
+                        <a:off x="3995057" y="0"/>
                         <a:ext cx="4391025" cy="3276600"/>
                       </a:xfrm>
                       <a:prstGeom prst="rect">
@@ -3864,7 +3908,7 @@
           <p:cNvPr id="4" name="Object 3">
             <a:extLst>
               <a:ext uri="{FF2B5EF4-FFF2-40B4-BE49-F238E27FC236}">
-                <a16:creationId xmlns:a16="http://schemas.microsoft.com/office/drawing/2014/main" id="{1F00B142-60EC-4551-8CB9-FF22C66401FC}"/>
+                <a16:creationId xmlns:a16="http://schemas.microsoft.com/office/drawing/2014/main" id="{F80C09EE-D686-478B-BF1D-B349AB0ED132}"/>
               </a:ext>
             </a:extLst>
           </p:cNvPr>
@@ -3874,20 +3918,20 @@
           <p:nvPr>
             <p:extLst>
               <p:ext uri="{D42A27DB-BD31-4B8C-83A1-F6EECF244321}">
-                <p14:modId xmlns:p14="http://schemas.microsoft.com/office/powerpoint/2010/main" val="946749503"/>
+                <p14:modId xmlns:p14="http://schemas.microsoft.com/office/powerpoint/2010/main" val="1849920694"/>
               </p:ext>
             </p:extLst>
           </p:nvPr>
         </p:nvGraphicFramePr>
         <p:xfrm>
-          <a:off x="4017510" y="0"/>
+          <a:off x="7990114" y="0"/>
           <a:ext cx="4391025" cy="3276600"/>
         </p:xfrm>
         <a:graphic>
           <a:graphicData uri="http://schemas.openxmlformats.org/presentationml/2006/ole">
             <mc:AlternateContent xmlns:mc="http://schemas.openxmlformats.org/markup-compatibility/2006">
               <mc:Choice xmlns:v="urn:schemas-microsoft-com:vml" Requires="v">
-                <p:oleObj spid="_x0000_s2064" name="Acrobat Document" r:id="rId7" imgW="4390885" imgH="3276600" progId="AcroExch.Document.DC">
+                <p:oleObj spid="_x0000_s7178" name="Acrobat Document" r:id="rId7" imgW="4390885" imgH="3276600" progId="AcroExch.Document.DC">
                   <p:embed/>
                 </p:oleObj>
               </mc:Choice>
@@ -3908,7 +3952,7 @@
                     </p:blipFill>
                     <p:spPr>
                       <a:xfrm>
-                        <a:off x="4017510" y="0"/>
+                        <a:off x="7990114" y="0"/>
                         <a:ext cx="4391025" cy="3276600"/>
                       </a:xfrm>
                       <a:prstGeom prst="rect">
@@ -3927,7 +3971,7 @@
           <p:cNvPr id="5" name="Object 4">
             <a:extLst>
               <a:ext uri="{FF2B5EF4-FFF2-40B4-BE49-F238E27FC236}">
-                <a16:creationId xmlns:a16="http://schemas.microsoft.com/office/drawing/2014/main" id="{9AC3F459-0244-4A3E-8A71-3CA317EBA5CC}"/>
+                <a16:creationId xmlns:a16="http://schemas.microsoft.com/office/drawing/2014/main" id="{9B7660BB-CEF4-4A4E-82F2-5ABBF11019F8}"/>
               </a:ext>
             </a:extLst>
           </p:cNvPr>
@@ -3937,20 +3981,20 @@
           <p:nvPr>
             <p:extLst>
               <p:ext uri="{D42A27DB-BD31-4B8C-83A1-F6EECF244321}">
-                <p14:modId xmlns:p14="http://schemas.microsoft.com/office/powerpoint/2010/main" val="1246600150"/>
+                <p14:modId xmlns:p14="http://schemas.microsoft.com/office/powerpoint/2010/main" val="1508423257"/>
               </p:ext>
             </p:extLst>
           </p:nvPr>
         </p:nvGraphicFramePr>
         <p:xfrm>
-          <a:off x="4017510" y="3276600"/>
+          <a:off x="0" y="3429000"/>
           <a:ext cx="4391025" cy="3276600"/>
         </p:xfrm>
         <a:graphic>
           <a:graphicData uri="http://schemas.openxmlformats.org/presentationml/2006/ole">
             <mc:AlternateContent xmlns:mc="http://schemas.openxmlformats.org/markup-compatibility/2006">
               <mc:Choice xmlns:v="urn:schemas-microsoft-com:vml" Requires="v">
-                <p:oleObj spid="_x0000_s2065" name="Acrobat Document" r:id="rId9" imgW="4390885" imgH="3276600" progId="AcroExch.Document.DC">
+                <p:oleObj spid="_x0000_s7179" name="Acrobat Document" r:id="rId9" imgW="4390885" imgH="3276600" progId="AcroExch.Document.DC">
                   <p:embed/>
                 </p:oleObj>
               </mc:Choice>
@@ -3959,7 +4003,13 @@
                   <p:embed/>
                   <p:pic>
                     <p:nvPicPr>
-                      <p:cNvPr id="0" name=""/>
+                      <p:cNvPr id="2" name="Object 1">
+                        <a:extLst>
+                          <a:ext uri="{FF2B5EF4-FFF2-40B4-BE49-F238E27FC236}">
+                            <a16:creationId xmlns:a16="http://schemas.microsoft.com/office/drawing/2014/main" id="{23A7F9BE-ED83-4929-B77C-DD92ECBE5F19}"/>
+                          </a:ext>
+                        </a:extLst>
+                      </p:cNvPr>
                       <p:cNvPicPr/>
                       <p:nvPr/>
                     </p:nvPicPr>
@@ -3971,7 +4021,7 @@
                     </p:blipFill>
                     <p:spPr>
                       <a:xfrm>
-                        <a:off x="4017510" y="3276600"/>
+                        <a:off x="0" y="3429000"/>
                         <a:ext cx="4391025" cy="3276600"/>
                       </a:xfrm>
                       <a:prstGeom prst="rect">
@@ -3990,7 +4040,7 @@
           <p:cNvPr id="6" name="Object 5">
             <a:extLst>
               <a:ext uri="{FF2B5EF4-FFF2-40B4-BE49-F238E27FC236}">
-                <a16:creationId xmlns:a16="http://schemas.microsoft.com/office/drawing/2014/main" id="{F71BEA5F-FD65-40A2-B2A0-590149201F45}"/>
+                <a16:creationId xmlns:a16="http://schemas.microsoft.com/office/drawing/2014/main" id="{2DED3847-1AA1-4603-8981-1CCDFFE86E7A}"/>
               </a:ext>
             </a:extLst>
           </p:cNvPr>
@@ -4000,20 +4050,20 @@
           <p:nvPr>
             <p:extLst>
               <p:ext uri="{D42A27DB-BD31-4B8C-83A1-F6EECF244321}">
-                <p14:modId xmlns:p14="http://schemas.microsoft.com/office/powerpoint/2010/main" val="334159767"/>
+                <p14:modId xmlns:p14="http://schemas.microsoft.com/office/powerpoint/2010/main" val="508783092"/>
               </p:ext>
             </p:extLst>
           </p:nvPr>
         </p:nvGraphicFramePr>
         <p:xfrm>
-          <a:off x="8035020" y="0"/>
+          <a:off x="3995057" y="3429000"/>
           <a:ext cx="4391025" cy="3276600"/>
         </p:xfrm>
         <a:graphic>
           <a:graphicData uri="http://schemas.openxmlformats.org/presentationml/2006/ole">
             <mc:AlternateContent xmlns:mc="http://schemas.openxmlformats.org/markup-compatibility/2006">
               <mc:Choice xmlns:v="urn:schemas-microsoft-com:vml" Requires="v">
-                <p:oleObj spid="_x0000_s2066" name="Acrobat Document" r:id="rId11" imgW="4390885" imgH="3276600" progId="AcroExch.Document.DC">
+                <p:oleObj spid="_x0000_s7180" name="Acrobat Document" r:id="rId11" imgW="4390885" imgH="3276600" progId="AcroExch.Document.DC">
                   <p:embed/>
                 </p:oleObj>
               </mc:Choice>
@@ -4022,7 +4072,13 @@
                   <p:embed/>
                   <p:pic>
                     <p:nvPicPr>
-                      <p:cNvPr id="0" name=""/>
+                      <p:cNvPr id="3" name="Object 2">
+                        <a:extLst>
+                          <a:ext uri="{FF2B5EF4-FFF2-40B4-BE49-F238E27FC236}">
+                            <a16:creationId xmlns:a16="http://schemas.microsoft.com/office/drawing/2014/main" id="{8D2D4425-61AF-4CCF-8A72-2F6784618CBB}"/>
+                          </a:ext>
+                        </a:extLst>
+                      </p:cNvPr>
                       <p:cNvPicPr/>
                       <p:nvPr/>
                     </p:nvPicPr>
@@ -4034,7 +4090,7 @@
                     </p:blipFill>
                     <p:spPr>
                       <a:xfrm>
-                        <a:off x="8035020" y="0"/>
+                        <a:off x="3995057" y="3429000"/>
                         <a:ext cx="4391025" cy="3276600"/>
                       </a:xfrm>
                       <a:prstGeom prst="rect">
@@ -4053,7 +4109,7 @@
           <p:cNvPr id="7" name="Object 6">
             <a:extLst>
               <a:ext uri="{FF2B5EF4-FFF2-40B4-BE49-F238E27FC236}">
-                <a16:creationId xmlns:a16="http://schemas.microsoft.com/office/drawing/2014/main" id="{3C614820-5454-4CA0-B56C-7D8B6B973039}"/>
+                <a16:creationId xmlns:a16="http://schemas.microsoft.com/office/drawing/2014/main" id="{0E6E1B66-5011-4454-9E16-5EB35254C444}"/>
               </a:ext>
             </a:extLst>
           </p:cNvPr>
@@ -4063,20 +4119,20 @@
           <p:nvPr>
             <p:extLst>
               <p:ext uri="{D42A27DB-BD31-4B8C-83A1-F6EECF244321}">
-                <p14:modId xmlns:p14="http://schemas.microsoft.com/office/powerpoint/2010/main" val="751634737"/>
+                <p14:modId xmlns:p14="http://schemas.microsoft.com/office/powerpoint/2010/main" val="4194597823"/>
               </p:ext>
             </p:extLst>
           </p:nvPr>
         </p:nvGraphicFramePr>
         <p:xfrm>
-          <a:off x="8035019" y="3276600"/>
+          <a:off x="7990114" y="3429000"/>
           <a:ext cx="4391025" cy="3276600"/>
         </p:xfrm>
         <a:graphic>
           <a:graphicData uri="http://schemas.openxmlformats.org/presentationml/2006/ole">
             <mc:AlternateContent xmlns:mc="http://schemas.openxmlformats.org/markup-compatibility/2006">
               <mc:Choice xmlns:v="urn:schemas-microsoft-com:vml" Requires="v">
-                <p:oleObj spid="_x0000_s2067" name="Acrobat Document" r:id="rId13" imgW="4390885" imgH="3276600" progId="AcroExch.Document.DC">
+                <p:oleObj spid="_x0000_s7181" name="Acrobat Document" r:id="rId13" imgW="4390885" imgH="3276600" progId="AcroExch.Document.DC">
                   <p:embed/>
                 </p:oleObj>
               </mc:Choice>
@@ -4097,7 +4153,7 @@
                     </p:blipFill>
                     <p:spPr>
                       <a:xfrm>
-                        <a:off x="8035019" y="3276600"/>
+                        <a:off x="7990114" y="3429000"/>
                         <a:ext cx="4391025" cy="3276600"/>
                       </a:xfrm>
                       <a:prstGeom prst="rect">
@@ -4114,7 +4170,7 @@
     </p:spTree>
     <p:extLst>
       <p:ext uri="{BB962C8B-B14F-4D97-AF65-F5344CB8AC3E}">
-        <p14:creationId xmlns:p14="http://schemas.microsoft.com/office/powerpoint/2010/main" val="2454128351"/>
+        <p14:creationId xmlns:p14="http://schemas.microsoft.com/office/powerpoint/2010/main" val="3236999468"/>
       </p:ext>
     </p:extLst>
   </p:cSld>
@@ -4143,10 +4199,10 @@
       </p:grpSpPr>
       <p:graphicFrame>
         <p:nvGraphicFramePr>
-          <p:cNvPr id="2" name="Object 1">
-            <a:extLst>
-              <a:ext uri="{FF2B5EF4-FFF2-40B4-BE49-F238E27FC236}">
-                <a16:creationId xmlns:a16="http://schemas.microsoft.com/office/drawing/2014/main" id="{431CFB65-9965-4973-988B-E851D73714AD}"/>
+          <p:cNvPr id="4" name="Object 3">
+            <a:extLst>
+              <a:ext uri="{FF2B5EF4-FFF2-40B4-BE49-F238E27FC236}">
+                <a16:creationId xmlns:a16="http://schemas.microsoft.com/office/drawing/2014/main" id="{1F00B142-60EC-4551-8CB9-FF22C66401FC}"/>
               </a:ext>
             </a:extLst>
           </p:cNvPr>
@@ -4156,7 +4212,7 @@
           <p:nvPr>
             <p:extLst>
               <p:ext uri="{D42A27DB-BD31-4B8C-83A1-F6EECF244321}">
-                <p14:modId xmlns:p14="http://schemas.microsoft.com/office/powerpoint/2010/main" val="1443143351"/>
+                <p14:modId xmlns:p14="http://schemas.microsoft.com/office/powerpoint/2010/main" val="1681750636"/>
               </p:ext>
             </p:extLst>
           </p:nvPr>
@@ -4169,7 +4225,7 @@
           <a:graphicData uri="http://schemas.openxmlformats.org/presentationml/2006/ole">
             <mc:AlternateContent xmlns:mc="http://schemas.openxmlformats.org/markup-compatibility/2006">
               <mc:Choice xmlns:v="urn:schemas-microsoft-com:vml" Requires="v">
-                <p:oleObj spid="_x0000_s3086" name="Acrobat Document" r:id="rId3" imgW="4390885" imgH="3276600" progId="AcroExch.Document.DC">
+                <p:oleObj spid="_x0000_s2080" name="Acrobat Document" r:id="rId3" imgW="4390885" imgH="3276600" progId="AcroExch.Document.DC">
                   <p:embed/>
                 </p:oleObj>
               </mc:Choice>
@@ -4206,10 +4262,10 @@
       </p:graphicFrame>
       <p:graphicFrame>
         <p:nvGraphicFramePr>
-          <p:cNvPr id="3" name="Object 2">
-            <a:extLst>
-              <a:ext uri="{FF2B5EF4-FFF2-40B4-BE49-F238E27FC236}">
-                <a16:creationId xmlns:a16="http://schemas.microsoft.com/office/drawing/2014/main" id="{FB6CCF45-1A0D-4EF8-B67E-8D7F34C2440C}"/>
+          <p:cNvPr id="5" name="Object 4">
+            <a:extLst>
+              <a:ext uri="{FF2B5EF4-FFF2-40B4-BE49-F238E27FC236}">
+                <a16:creationId xmlns:a16="http://schemas.microsoft.com/office/drawing/2014/main" id="{9AC3F459-0244-4A3E-8A71-3CA317EBA5CC}"/>
               </a:ext>
             </a:extLst>
           </p:cNvPr>
@@ -4219,20 +4275,20 @@
           <p:nvPr>
             <p:extLst>
               <p:ext uri="{D42A27DB-BD31-4B8C-83A1-F6EECF244321}">
-                <p14:modId xmlns:p14="http://schemas.microsoft.com/office/powerpoint/2010/main" val="1671282469"/>
+                <p14:modId xmlns:p14="http://schemas.microsoft.com/office/powerpoint/2010/main" val="3824260676"/>
               </p:ext>
             </p:extLst>
           </p:nvPr>
         </p:nvGraphicFramePr>
         <p:xfrm>
-          <a:off x="0" y="3276600"/>
+          <a:off x="4011953" y="0"/>
           <a:ext cx="4391025" cy="3276600"/>
         </p:xfrm>
         <a:graphic>
           <a:graphicData uri="http://schemas.openxmlformats.org/presentationml/2006/ole">
             <mc:AlternateContent xmlns:mc="http://schemas.openxmlformats.org/markup-compatibility/2006">
               <mc:Choice xmlns:v="urn:schemas-microsoft-com:vml" Requires="v">
-                <p:oleObj spid="_x0000_s3087" name="Acrobat Document" r:id="rId5" imgW="4390885" imgH="3276600" progId="AcroExch.Document.DC">
+                <p:oleObj spid="_x0000_s2081" name="Acrobat Document" r:id="rId5" imgW="4390885" imgH="3276600" progId="AcroExch.Document.DC">
                   <p:embed/>
                 </p:oleObj>
               </mc:Choice>
@@ -4253,7 +4309,7 @@
                     </p:blipFill>
                     <p:spPr>
                       <a:xfrm>
-                        <a:off x="0" y="3276600"/>
+                        <a:off x="4011953" y="0"/>
                         <a:ext cx="4391025" cy="3276600"/>
                       </a:xfrm>
                       <a:prstGeom prst="rect">
@@ -4269,10 +4325,10 @@
       </p:graphicFrame>
       <p:graphicFrame>
         <p:nvGraphicFramePr>
-          <p:cNvPr id="4" name="Object 3">
-            <a:extLst>
-              <a:ext uri="{FF2B5EF4-FFF2-40B4-BE49-F238E27FC236}">
-                <a16:creationId xmlns:a16="http://schemas.microsoft.com/office/drawing/2014/main" id="{5A57EB15-2235-4673-BC76-6A8DB30D3976}"/>
+          <p:cNvPr id="6" name="Object 5">
+            <a:extLst>
+              <a:ext uri="{FF2B5EF4-FFF2-40B4-BE49-F238E27FC236}">
+                <a16:creationId xmlns:a16="http://schemas.microsoft.com/office/drawing/2014/main" id="{F71BEA5F-FD65-40A2-B2A0-590149201F45}"/>
               </a:ext>
             </a:extLst>
           </p:cNvPr>
@@ -4282,20 +4338,20 @@
           <p:nvPr>
             <p:extLst>
               <p:ext uri="{D42A27DB-BD31-4B8C-83A1-F6EECF244321}">
-                <p14:modId xmlns:p14="http://schemas.microsoft.com/office/powerpoint/2010/main" val="3344233134"/>
+                <p14:modId xmlns:p14="http://schemas.microsoft.com/office/powerpoint/2010/main" val="2558849828"/>
               </p:ext>
             </p:extLst>
           </p:nvPr>
         </p:nvGraphicFramePr>
         <p:xfrm>
-          <a:off x="4027488" y="0"/>
+          <a:off x="0" y="3429000"/>
           <a:ext cx="4391025" cy="3276600"/>
         </p:xfrm>
         <a:graphic>
           <a:graphicData uri="http://schemas.openxmlformats.org/presentationml/2006/ole">
             <mc:AlternateContent xmlns:mc="http://schemas.openxmlformats.org/markup-compatibility/2006">
               <mc:Choice xmlns:v="urn:schemas-microsoft-com:vml" Requires="v">
-                <p:oleObj spid="_x0000_s3088" name="Acrobat Document" r:id="rId7" imgW="4390885" imgH="3276600" progId="AcroExch.Document.DC">
+                <p:oleObj spid="_x0000_s2082" name="Acrobat Document" r:id="rId7" imgW="4390885" imgH="3276600" progId="AcroExch.Document.DC">
                   <p:embed/>
                 </p:oleObj>
               </mc:Choice>
@@ -4316,7 +4372,7 @@
                     </p:blipFill>
                     <p:spPr>
                       <a:xfrm>
-                        <a:off x="4027488" y="0"/>
+                        <a:off x="0" y="3429000"/>
                         <a:ext cx="4391025" cy="3276600"/>
                       </a:xfrm>
                       <a:prstGeom prst="rect">
@@ -4332,10 +4388,10 @@
       </p:graphicFrame>
       <p:graphicFrame>
         <p:nvGraphicFramePr>
-          <p:cNvPr id="5" name="Object 4">
-            <a:extLst>
-              <a:ext uri="{FF2B5EF4-FFF2-40B4-BE49-F238E27FC236}">
-                <a16:creationId xmlns:a16="http://schemas.microsoft.com/office/drawing/2014/main" id="{88B72439-AE3D-4CEA-B500-F3A06674B319}"/>
+          <p:cNvPr id="7" name="Object 6">
+            <a:extLst>
+              <a:ext uri="{FF2B5EF4-FFF2-40B4-BE49-F238E27FC236}">
+                <a16:creationId xmlns:a16="http://schemas.microsoft.com/office/drawing/2014/main" id="{3C614820-5454-4CA0-B56C-7D8B6B973039}"/>
               </a:ext>
             </a:extLst>
           </p:cNvPr>
@@ -4345,20 +4401,20 @@
           <p:nvPr>
             <p:extLst>
               <p:ext uri="{D42A27DB-BD31-4B8C-83A1-F6EECF244321}">
-                <p14:modId xmlns:p14="http://schemas.microsoft.com/office/powerpoint/2010/main" val="3842859824"/>
+                <p14:modId xmlns:p14="http://schemas.microsoft.com/office/powerpoint/2010/main" val="4046285172"/>
               </p:ext>
             </p:extLst>
           </p:nvPr>
         </p:nvGraphicFramePr>
         <p:xfrm>
-          <a:off x="4027488" y="3276600"/>
+          <a:off x="4011953" y="3429000"/>
           <a:ext cx="4391025" cy="3276600"/>
         </p:xfrm>
         <a:graphic>
           <a:graphicData uri="http://schemas.openxmlformats.org/presentationml/2006/ole">
             <mc:AlternateContent xmlns:mc="http://schemas.openxmlformats.org/markup-compatibility/2006">
               <mc:Choice xmlns:v="urn:schemas-microsoft-com:vml" Requires="v">
-                <p:oleObj spid="_x0000_s3089" name="Acrobat Document" r:id="rId9" imgW="4390885" imgH="3276600" progId="AcroExch.Document.DC">
+                <p:oleObj spid="_x0000_s2083" name="Acrobat Document" r:id="rId9" imgW="4390885" imgH="3276600" progId="AcroExch.Document.DC">
                   <p:embed/>
                 </p:oleObj>
               </mc:Choice>
@@ -4379,7 +4435,7 @@
                     </p:blipFill>
                     <p:spPr>
                       <a:xfrm>
-                        <a:off x="4027488" y="3276600"/>
+                        <a:off x="4011953" y="3429000"/>
                         <a:ext cx="4391025" cy="3276600"/>
                       </a:xfrm>
                       <a:prstGeom prst="rect">
@@ -4395,10 +4451,10 @@
       </p:graphicFrame>
       <p:graphicFrame>
         <p:nvGraphicFramePr>
-          <p:cNvPr id="6" name="Object 5">
-            <a:extLst>
-              <a:ext uri="{FF2B5EF4-FFF2-40B4-BE49-F238E27FC236}">
-                <a16:creationId xmlns:a16="http://schemas.microsoft.com/office/drawing/2014/main" id="{E608554C-C896-4238-81BC-EC2AEF312BE4}"/>
+          <p:cNvPr id="8" name="Object 7">
+            <a:extLst>
+              <a:ext uri="{FF2B5EF4-FFF2-40B4-BE49-F238E27FC236}">
+                <a16:creationId xmlns:a16="http://schemas.microsoft.com/office/drawing/2014/main" id="{A5332AEC-89D8-48B3-BF46-45A0C915B023}"/>
               </a:ext>
             </a:extLst>
           </p:cNvPr>
@@ -4408,20 +4464,20 @@
           <p:nvPr>
             <p:extLst>
               <p:ext uri="{D42A27DB-BD31-4B8C-83A1-F6EECF244321}">
-                <p14:modId xmlns:p14="http://schemas.microsoft.com/office/powerpoint/2010/main" val="634107667"/>
+                <p14:modId xmlns:p14="http://schemas.microsoft.com/office/powerpoint/2010/main" val="3124303300"/>
               </p:ext>
             </p:extLst>
           </p:nvPr>
         </p:nvGraphicFramePr>
         <p:xfrm>
-          <a:off x="8054976" y="0"/>
+          <a:off x="8023906" y="0"/>
           <a:ext cx="4391025" cy="3276600"/>
         </p:xfrm>
         <a:graphic>
           <a:graphicData uri="http://schemas.openxmlformats.org/presentationml/2006/ole">
             <mc:AlternateContent xmlns:mc="http://schemas.openxmlformats.org/markup-compatibility/2006">
               <mc:Choice xmlns:v="urn:schemas-microsoft-com:vml" Requires="v">
-                <p:oleObj spid="_x0000_s3090" name="Acrobat Document" r:id="rId11" imgW="4390885" imgH="3276600" progId="AcroExch.Document.DC">
+                <p:oleObj spid="_x0000_s2084" name="Acrobat Document" r:id="rId11" imgW="4390885" imgH="3276600" progId="AcroExch.Document.DC">
                   <p:embed/>
                 </p:oleObj>
               </mc:Choice>
@@ -4442,7 +4498,7 @@
                     </p:blipFill>
                     <p:spPr>
                       <a:xfrm>
-                        <a:off x="8054976" y="0"/>
+                        <a:off x="8023906" y="0"/>
                         <a:ext cx="4391025" cy="3276600"/>
                       </a:xfrm>
                       <a:prstGeom prst="rect">
@@ -4458,10 +4514,10 @@
       </p:graphicFrame>
       <p:graphicFrame>
         <p:nvGraphicFramePr>
-          <p:cNvPr id="7" name="Object 6">
-            <a:extLst>
-              <a:ext uri="{FF2B5EF4-FFF2-40B4-BE49-F238E27FC236}">
-                <a16:creationId xmlns:a16="http://schemas.microsoft.com/office/drawing/2014/main" id="{9B925EAF-A072-46DB-8B53-9A1EAA7A767B}"/>
+          <p:cNvPr id="9" name="Object 8">
+            <a:extLst>
+              <a:ext uri="{FF2B5EF4-FFF2-40B4-BE49-F238E27FC236}">
+                <a16:creationId xmlns:a16="http://schemas.microsoft.com/office/drawing/2014/main" id="{E5A9CAD6-FEDD-4F1E-BAAD-6C8C67E24ADD}"/>
               </a:ext>
             </a:extLst>
           </p:cNvPr>
@@ -4471,20 +4527,20 @@
           <p:nvPr>
             <p:extLst>
               <p:ext uri="{D42A27DB-BD31-4B8C-83A1-F6EECF244321}">
-                <p14:modId xmlns:p14="http://schemas.microsoft.com/office/powerpoint/2010/main" val="1090585449"/>
+                <p14:modId xmlns:p14="http://schemas.microsoft.com/office/powerpoint/2010/main" val="2727853011"/>
               </p:ext>
             </p:extLst>
           </p:nvPr>
         </p:nvGraphicFramePr>
         <p:xfrm>
-          <a:off x="8054976" y="3276600"/>
+          <a:off x="8023906" y="3429000"/>
           <a:ext cx="4391025" cy="3276600"/>
         </p:xfrm>
         <a:graphic>
           <a:graphicData uri="http://schemas.openxmlformats.org/presentationml/2006/ole">
             <mc:AlternateContent xmlns:mc="http://schemas.openxmlformats.org/markup-compatibility/2006">
               <mc:Choice xmlns:v="urn:schemas-microsoft-com:vml" Requires="v">
-                <p:oleObj spid="_x0000_s3091" name="Acrobat Document" r:id="rId13" imgW="4390885" imgH="3276600" progId="AcroExch.Document.DC">
+                <p:oleObj spid="_x0000_s2085" name="Acrobat Document" r:id="rId13" imgW="4390885" imgH="3276600" progId="AcroExch.Document.DC">
                   <p:embed/>
                 </p:oleObj>
               </mc:Choice>
@@ -4505,7 +4561,7 @@
                     </p:blipFill>
                     <p:spPr>
                       <a:xfrm>
-                        <a:off x="8054976" y="3276600"/>
+                        <a:off x="8023906" y="3429000"/>
                         <a:ext cx="4391025" cy="3276600"/>
                       </a:xfrm>
                       <a:prstGeom prst="rect">
@@ -4522,7 +4578,7 @@
     </p:spTree>
     <p:extLst>
       <p:ext uri="{BB962C8B-B14F-4D97-AF65-F5344CB8AC3E}">
-        <p14:creationId xmlns:p14="http://schemas.microsoft.com/office/powerpoint/2010/main" val="3462444782"/>
+        <p14:creationId xmlns:p14="http://schemas.microsoft.com/office/powerpoint/2010/main" val="2454128351"/>
       </p:ext>
     </p:extLst>
   </p:cSld>
@@ -4554,7 +4610,7 @@
           <p:cNvPr id="2" name="Object 1">
             <a:extLst>
               <a:ext uri="{FF2B5EF4-FFF2-40B4-BE49-F238E27FC236}">
-                <a16:creationId xmlns:a16="http://schemas.microsoft.com/office/drawing/2014/main" id="{EE79D353-B65F-4B4D-81EB-B1F7952B9FF4}"/>
+                <a16:creationId xmlns:a16="http://schemas.microsoft.com/office/drawing/2014/main" id="{4DDF129E-3B7D-44EC-9CDB-0C65857C226F}"/>
               </a:ext>
             </a:extLst>
           </p:cNvPr>
@@ -4564,7 +4620,7 @@
           <p:nvPr>
             <p:extLst>
               <p:ext uri="{D42A27DB-BD31-4B8C-83A1-F6EECF244321}">
-                <p14:modId xmlns:p14="http://schemas.microsoft.com/office/powerpoint/2010/main" val="26646589"/>
+                <p14:modId xmlns:p14="http://schemas.microsoft.com/office/powerpoint/2010/main" val="670213497"/>
               </p:ext>
             </p:extLst>
           </p:nvPr>
@@ -4577,7 +4633,7 @@
           <a:graphicData uri="http://schemas.openxmlformats.org/presentationml/2006/ole">
             <mc:AlternateContent xmlns:mc="http://schemas.openxmlformats.org/markup-compatibility/2006">
               <mc:Choice xmlns:v="urn:schemas-microsoft-com:vml" Requires="v">
-                <p:oleObj spid="_x0000_s4104" name="Acrobat Document" r:id="rId3" imgW="4390885" imgH="3276600" progId="AcroExch.Document.DC">
+                <p:oleObj spid="_x0000_s8204" name="Acrobat Document" r:id="rId3" imgW="4390885" imgH="3276600" progId="AcroExch.Document.DC">
                   <p:embed/>
                 </p:oleObj>
               </mc:Choice>
@@ -4586,7 +4642,13 @@
                   <p:embed/>
                   <p:pic>
                     <p:nvPicPr>
-                      <p:cNvPr id="0" name=""/>
+                      <p:cNvPr id="2" name="Object 1">
+                        <a:extLst>
+                          <a:ext uri="{FF2B5EF4-FFF2-40B4-BE49-F238E27FC236}">
+                            <a16:creationId xmlns:a16="http://schemas.microsoft.com/office/drawing/2014/main" id="{431CFB65-9965-4973-988B-E851D73714AD}"/>
+                          </a:ext>
+                        </a:extLst>
+                      </p:cNvPr>
                       <p:cNvPicPr/>
                       <p:nvPr/>
                     </p:nvPicPr>
@@ -4617,7 +4679,7 @@
           <p:cNvPr id="3" name="Object 2">
             <a:extLst>
               <a:ext uri="{FF2B5EF4-FFF2-40B4-BE49-F238E27FC236}">
-                <a16:creationId xmlns:a16="http://schemas.microsoft.com/office/drawing/2014/main" id="{56E6FA22-D449-4E28-BA41-930DD603A2DB}"/>
+                <a16:creationId xmlns:a16="http://schemas.microsoft.com/office/drawing/2014/main" id="{0D0F1061-30C6-4A16-81FD-B9FD3B8A3248}"/>
               </a:ext>
             </a:extLst>
           </p:cNvPr>
@@ -4627,7 +4689,76 @@
           <p:nvPr>
             <p:extLst>
               <p:ext uri="{D42A27DB-BD31-4B8C-83A1-F6EECF244321}">
-                <p14:modId xmlns:p14="http://schemas.microsoft.com/office/powerpoint/2010/main" val="692566717"/>
+                <p14:modId xmlns:p14="http://schemas.microsoft.com/office/powerpoint/2010/main" val="151569727"/>
+              </p:ext>
+            </p:extLst>
+          </p:nvPr>
+        </p:nvGraphicFramePr>
+        <p:xfrm>
+          <a:off x="4049486" y="0"/>
+          <a:ext cx="4391025" cy="3276600"/>
+        </p:xfrm>
+        <a:graphic>
+          <a:graphicData uri="http://schemas.openxmlformats.org/presentationml/2006/ole">
+            <mc:AlternateContent xmlns:mc="http://schemas.openxmlformats.org/markup-compatibility/2006">
+              <mc:Choice xmlns:v="urn:schemas-microsoft-com:vml" Requires="v">
+                <p:oleObj spid="_x0000_s8205" name="Acrobat Document" r:id="rId5" imgW="4390885" imgH="3276600" progId="AcroExch.Document.DC">
+                  <p:embed/>
+                </p:oleObj>
+              </mc:Choice>
+              <mc:Fallback>
+                <p:oleObj name="Acrobat Document" r:id="rId5" imgW="4390885" imgH="3276600" progId="AcroExch.Document.DC">
+                  <p:embed/>
+                  <p:pic>
+                    <p:nvPicPr>
+                      <p:cNvPr id="3" name="Object 2">
+                        <a:extLst>
+                          <a:ext uri="{FF2B5EF4-FFF2-40B4-BE49-F238E27FC236}">
+                            <a16:creationId xmlns:a16="http://schemas.microsoft.com/office/drawing/2014/main" id="{FB6CCF45-1A0D-4EF8-B67E-8D7F34C2440C}"/>
+                          </a:ext>
+                        </a:extLst>
+                      </p:cNvPr>
+                      <p:cNvPicPr/>
+                      <p:nvPr/>
+                    </p:nvPicPr>
+                    <p:blipFill>
+                      <a:blip r:embed="rId6"/>
+                      <a:stretch>
+                        <a:fillRect/>
+                      </a:stretch>
+                    </p:blipFill>
+                    <p:spPr>
+                      <a:xfrm>
+                        <a:off x="4049486" y="0"/>
+                        <a:ext cx="4391025" cy="3276600"/>
+                      </a:xfrm>
+                      <a:prstGeom prst="rect">
+                        <a:avLst/>
+                      </a:prstGeom>
+                    </p:spPr>
+                  </p:pic>
+                </p:oleObj>
+              </mc:Fallback>
+            </mc:AlternateContent>
+          </a:graphicData>
+        </a:graphic>
+      </p:graphicFrame>
+      <p:graphicFrame>
+        <p:nvGraphicFramePr>
+          <p:cNvPr id="5" name="Object 4">
+            <a:extLst>
+              <a:ext uri="{FF2B5EF4-FFF2-40B4-BE49-F238E27FC236}">
+                <a16:creationId xmlns:a16="http://schemas.microsoft.com/office/drawing/2014/main" id="{8F3E0896-A296-4B15-BCF6-76D48062239C}"/>
+              </a:ext>
+            </a:extLst>
+          </p:cNvPr>
+          <p:cNvGraphicFramePr>
+            <a:graphicFrameLocks noChangeAspect="1"/>
+          </p:cNvGraphicFramePr>
+          <p:nvPr>
+            <p:extLst>
+              <p:ext uri="{D42A27DB-BD31-4B8C-83A1-F6EECF244321}">
+                <p14:modId xmlns:p14="http://schemas.microsoft.com/office/powerpoint/2010/main" val="2098889167"/>
               </p:ext>
             </p:extLst>
           </p:nvPr>
@@ -4640,21 +4771,27 @@
           <a:graphicData uri="http://schemas.openxmlformats.org/presentationml/2006/ole">
             <mc:AlternateContent xmlns:mc="http://schemas.openxmlformats.org/markup-compatibility/2006">
               <mc:Choice xmlns:v="urn:schemas-microsoft-com:vml" Requires="v">
-                <p:oleObj spid="_x0000_s4105" name="Acrobat Document" r:id="rId5" imgW="4390885" imgH="3276600" progId="AcroExch.Document.DC">
+                <p:oleObj spid="_x0000_s8206" name="Acrobat Document" r:id="rId7" imgW="4390885" imgH="3276600" progId="AcroExch.Document.DC">
                   <p:embed/>
                 </p:oleObj>
               </mc:Choice>
               <mc:Fallback>
-                <p:oleObj name="Acrobat Document" r:id="rId5" imgW="4390885" imgH="3276600" progId="AcroExch.Document.DC">
+                <p:oleObj name="Acrobat Document" r:id="rId7" imgW="4390885" imgH="3276600" progId="AcroExch.Document.DC">
                   <p:embed/>
                   <p:pic>
                     <p:nvPicPr>
-                      <p:cNvPr id="0" name=""/>
+                      <p:cNvPr id="4" name="Object 3">
+                        <a:extLst>
+                          <a:ext uri="{FF2B5EF4-FFF2-40B4-BE49-F238E27FC236}">
+                            <a16:creationId xmlns:a16="http://schemas.microsoft.com/office/drawing/2014/main" id="{5A57EB15-2235-4673-BC76-6A8DB30D3976}"/>
+                          </a:ext>
+                        </a:extLst>
+                      </p:cNvPr>
                       <p:cNvPicPr/>
                       <p:nvPr/>
                     </p:nvPicPr>
                     <p:blipFill>
-                      <a:blip r:embed="rId6"/>
+                      <a:blip r:embed="rId8"/>
                       <a:stretch>
                         <a:fillRect/>
                       </a:stretch>
@@ -4677,10 +4814,10 @@
       </p:graphicFrame>
       <p:graphicFrame>
         <p:nvGraphicFramePr>
-          <p:cNvPr id="4" name="Object 3">
-            <a:extLst>
-              <a:ext uri="{FF2B5EF4-FFF2-40B4-BE49-F238E27FC236}">
-                <a16:creationId xmlns:a16="http://schemas.microsoft.com/office/drawing/2014/main" id="{E114CE32-2454-43F9-885C-D5E83E4AFBAE}"/>
+          <p:cNvPr id="6" name="Object 5">
+            <a:extLst>
+              <a:ext uri="{FF2B5EF4-FFF2-40B4-BE49-F238E27FC236}">
+                <a16:creationId xmlns:a16="http://schemas.microsoft.com/office/drawing/2014/main" id="{6F22DC8A-DE18-4A96-B158-02ECD60D3EF8}"/>
               </a:ext>
             </a:extLst>
           </p:cNvPr>
@@ -4690,25 +4827,94 @@
           <p:nvPr>
             <p:extLst>
               <p:ext uri="{D42A27DB-BD31-4B8C-83A1-F6EECF244321}">
-                <p14:modId xmlns:p14="http://schemas.microsoft.com/office/powerpoint/2010/main" val="351393339"/>
+                <p14:modId xmlns:p14="http://schemas.microsoft.com/office/powerpoint/2010/main" val="3343003754"/>
               </p:ext>
             </p:extLst>
           </p:nvPr>
         </p:nvGraphicFramePr>
         <p:xfrm>
-          <a:off x="4039281" y="3276600"/>
+          <a:off x="4049486" y="3276600"/>
           <a:ext cx="4391025" cy="3276600"/>
         </p:xfrm>
         <a:graphic>
           <a:graphicData uri="http://schemas.openxmlformats.org/presentationml/2006/ole">
             <mc:AlternateContent xmlns:mc="http://schemas.openxmlformats.org/markup-compatibility/2006">
               <mc:Choice xmlns:v="urn:schemas-microsoft-com:vml" Requires="v">
-                <p:oleObj spid="_x0000_s4106" name="Acrobat Document" r:id="rId7" imgW="4390885" imgH="3276600" progId="AcroExch.Document.DC">
+                <p:oleObj spid="_x0000_s8207" name="Acrobat Document" r:id="rId9" imgW="4390885" imgH="3276600" progId="AcroExch.Document.DC">
                   <p:embed/>
                 </p:oleObj>
               </mc:Choice>
               <mc:Fallback>
-                <p:oleObj name="Acrobat Document" r:id="rId7" imgW="4390885" imgH="3276600" progId="AcroExch.Document.DC">
+                <p:oleObj name="Acrobat Document" r:id="rId9" imgW="4390885" imgH="3276600" progId="AcroExch.Document.DC">
+                  <p:embed/>
+                  <p:pic>
+                    <p:nvPicPr>
+                      <p:cNvPr id="5" name="Object 4">
+                        <a:extLst>
+                          <a:ext uri="{FF2B5EF4-FFF2-40B4-BE49-F238E27FC236}">
+                            <a16:creationId xmlns:a16="http://schemas.microsoft.com/office/drawing/2014/main" id="{88B72439-AE3D-4CEA-B500-F3A06674B319}"/>
+                          </a:ext>
+                        </a:extLst>
+                      </p:cNvPr>
+                      <p:cNvPicPr/>
+                      <p:nvPr/>
+                    </p:nvPicPr>
+                    <p:blipFill>
+                      <a:blip r:embed="rId10"/>
+                      <a:stretch>
+                        <a:fillRect/>
+                      </a:stretch>
+                    </p:blipFill>
+                    <p:spPr>
+                      <a:xfrm>
+                        <a:off x="4049486" y="3276600"/>
+                        <a:ext cx="4391025" cy="3276600"/>
+                      </a:xfrm>
+                      <a:prstGeom prst="rect">
+                        <a:avLst/>
+                      </a:prstGeom>
+                    </p:spPr>
+                  </p:pic>
+                </p:oleObj>
+              </mc:Fallback>
+            </mc:AlternateContent>
+          </a:graphicData>
+        </a:graphic>
+      </p:graphicFrame>
+      <p:graphicFrame>
+        <p:nvGraphicFramePr>
+          <p:cNvPr id="7" name="Object 6">
+            <a:extLst>
+              <a:ext uri="{FF2B5EF4-FFF2-40B4-BE49-F238E27FC236}">
+                <a16:creationId xmlns:a16="http://schemas.microsoft.com/office/drawing/2014/main" id="{F5D89DEC-76BB-4D81-A517-EA7F7705A594}"/>
+              </a:ext>
+            </a:extLst>
+          </p:cNvPr>
+          <p:cNvGraphicFramePr>
+            <a:graphicFrameLocks noChangeAspect="1"/>
+          </p:cNvGraphicFramePr>
+          <p:nvPr>
+            <p:extLst>
+              <p:ext uri="{D42A27DB-BD31-4B8C-83A1-F6EECF244321}">
+                <p14:modId xmlns:p14="http://schemas.microsoft.com/office/powerpoint/2010/main" val="774828696"/>
+              </p:ext>
+            </p:extLst>
+          </p:nvPr>
+        </p:nvGraphicFramePr>
+        <p:xfrm>
+          <a:off x="8000845" y="0"/>
+          <a:ext cx="4391025" cy="3276600"/>
+        </p:xfrm>
+        <a:graphic>
+          <a:graphicData uri="http://schemas.openxmlformats.org/presentationml/2006/ole">
+            <mc:AlternateContent xmlns:mc="http://schemas.openxmlformats.org/markup-compatibility/2006">
+              <mc:Choice xmlns:v="urn:schemas-microsoft-com:vml" Requires="v">
+                <p:oleObj spid="_x0000_s8208" name="Acrobat Document" r:id="rId11" imgW="4390885" imgH="3276600" progId="AcroExch.Document.DC">
+                  <p:embed/>
+                </p:oleObj>
+              </mc:Choice>
+              <mc:Fallback>
+                <p:oleObj name="Acrobat Document" r:id="rId11" imgW="4390885" imgH="3276600" progId="AcroExch.Document.DC">
                   <p:embed/>
                   <p:pic>
                     <p:nvPicPr>
@@ -4717,14 +4923,77 @@
                       <p:nvPr/>
                     </p:nvPicPr>
                     <p:blipFill>
-                      <a:blip r:embed="rId8"/>
+                      <a:blip r:embed="rId12"/>
                       <a:stretch>
                         <a:fillRect/>
                       </a:stretch>
                     </p:blipFill>
                     <p:spPr>
                       <a:xfrm>
-                        <a:off x="4039281" y="3276600"/>
+                        <a:off x="8000845" y="0"/>
+                        <a:ext cx="4391025" cy="3276600"/>
+                      </a:xfrm>
+                      <a:prstGeom prst="rect">
+                        <a:avLst/>
+                      </a:prstGeom>
+                    </p:spPr>
+                  </p:pic>
+                </p:oleObj>
+              </mc:Fallback>
+            </mc:AlternateContent>
+          </a:graphicData>
+        </a:graphic>
+      </p:graphicFrame>
+      <p:graphicFrame>
+        <p:nvGraphicFramePr>
+          <p:cNvPr id="8" name="Object 7">
+            <a:extLst>
+              <a:ext uri="{FF2B5EF4-FFF2-40B4-BE49-F238E27FC236}">
+                <a16:creationId xmlns:a16="http://schemas.microsoft.com/office/drawing/2014/main" id="{84855DC0-72CB-4BA8-BA86-33DDC9521F49}"/>
+              </a:ext>
+            </a:extLst>
+          </p:cNvPr>
+          <p:cNvGraphicFramePr>
+            <a:graphicFrameLocks noChangeAspect="1"/>
+          </p:cNvGraphicFramePr>
+          <p:nvPr>
+            <p:extLst>
+              <p:ext uri="{D42A27DB-BD31-4B8C-83A1-F6EECF244321}">
+                <p14:modId xmlns:p14="http://schemas.microsoft.com/office/powerpoint/2010/main" val="1693634764"/>
+              </p:ext>
+            </p:extLst>
+          </p:nvPr>
+        </p:nvGraphicFramePr>
+        <p:xfrm>
+          <a:off x="8000844" y="3276600"/>
+          <a:ext cx="4391025" cy="3276600"/>
+        </p:xfrm>
+        <a:graphic>
+          <a:graphicData uri="http://schemas.openxmlformats.org/presentationml/2006/ole">
+            <mc:AlternateContent xmlns:mc="http://schemas.openxmlformats.org/markup-compatibility/2006">
+              <mc:Choice xmlns:v="urn:schemas-microsoft-com:vml" Requires="v">
+                <p:oleObj spid="_x0000_s8209" name="Acrobat Document" r:id="rId13" imgW="4390885" imgH="3276600" progId="AcroExch.Document.DC">
+                  <p:embed/>
+                </p:oleObj>
+              </mc:Choice>
+              <mc:Fallback>
+                <p:oleObj name="Acrobat Document" r:id="rId13" imgW="4390885" imgH="3276600" progId="AcroExch.Document.DC">
+                  <p:embed/>
+                  <p:pic>
+                    <p:nvPicPr>
+                      <p:cNvPr id="0" name=""/>
+                      <p:cNvPicPr/>
+                      <p:nvPr/>
+                    </p:nvPicPr>
+                    <p:blipFill>
+                      <a:blip r:embed="rId14"/>
+                      <a:stretch>
+                        <a:fillRect/>
+                      </a:stretch>
+                    </p:blipFill>
+                    <p:spPr>
+                      <a:xfrm>
+                        <a:off x="8000844" y="3276600"/>
                         <a:ext cx="4391025" cy="3276600"/>
                       </a:xfrm>
                       <a:prstGeom prst="rect">
@@ -4741,7 +5010,7 @@
     </p:spTree>
     <p:extLst>
       <p:ext uri="{BB962C8B-B14F-4D97-AF65-F5344CB8AC3E}">
-        <p14:creationId xmlns:p14="http://schemas.microsoft.com/office/powerpoint/2010/main" val="1792971804"/>
+        <p14:creationId xmlns:p14="http://schemas.microsoft.com/office/powerpoint/2010/main" val="3481659843"/>
       </p:ext>
     </p:extLst>
   </p:cSld>
@@ -4770,6 +5039,582 @@
       </p:grpSpPr>
       <p:graphicFrame>
         <p:nvGraphicFramePr>
+          <p:cNvPr id="6" name="Object 5">
+            <a:extLst>
+              <a:ext uri="{FF2B5EF4-FFF2-40B4-BE49-F238E27FC236}">
+                <a16:creationId xmlns:a16="http://schemas.microsoft.com/office/drawing/2014/main" id="{E608554C-C896-4238-81BC-EC2AEF312BE4}"/>
+              </a:ext>
+            </a:extLst>
+          </p:cNvPr>
+          <p:cNvGraphicFramePr>
+            <a:graphicFrameLocks noChangeAspect="1"/>
+          </p:cNvGraphicFramePr>
+          <p:nvPr>
+            <p:extLst>
+              <p:ext uri="{D42A27DB-BD31-4B8C-83A1-F6EECF244321}">
+                <p14:modId xmlns:p14="http://schemas.microsoft.com/office/powerpoint/2010/main" val="2752463925"/>
+              </p:ext>
+            </p:extLst>
+          </p:nvPr>
+        </p:nvGraphicFramePr>
+        <p:xfrm>
+          <a:off x="0" y="0"/>
+          <a:ext cx="4391025" cy="3276600"/>
+        </p:xfrm>
+        <a:graphic>
+          <a:graphicData uri="http://schemas.openxmlformats.org/presentationml/2006/ole">
+            <mc:AlternateContent xmlns:mc="http://schemas.openxmlformats.org/markup-compatibility/2006">
+              <mc:Choice xmlns:v="urn:schemas-microsoft-com:vml" Requires="v">
+                <p:oleObj spid="_x0000_s3105" name="Acrobat Document" r:id="rId3" imgW="4390885" imgH="3276600" progId="AcroExch.Document.DC">
+                  <p:embed/>
+                </p:oleObj>
+              </mc:Choice>
+              <mc:Fallback>
+                <p:oleObj name="Acrobat Document" r:id="rId3" imgW="4390885" imgH="3276600" progId="AcroExch.Document.DC">
+                  <p:embed/>
+                  <p:pic>
+                    <p:nvPicPr>
+                      <p:cNvPr id="0" name=""/>
+                      <p:cNvPicPr/>
+                      <p:nvPr/>
+                    </p:nvPicPr>
+                    <p:blipFill>
+                      <a:blip r:embed="rId4"/>
+                      <a:stretch>
+                        <a:fillRect/>
+                      </a:stretch>
+                    </p:blipFill>
+                    <p:spPr>
+                      <a:xfrm>
+                        <a:off x="0" y="0"/>
+                        <a:ext cx="4391025" cy="3276600"/>
+                      </a:xfrm>
+                      <a:prstGeom prst="rect">
+                        <a:avLst/>
+                      </a:prstGeom>
+                    </p:spPr>
+                  </p:pic>
+                </p:oleObj>
+              </mc:Fallback>
+            </mc:AlternateContent>
+          </a:graphicData>
+        </a:graphic>
+      </p:graphicFrame>
+      <p:graphicFrame>
+        <p:nvGraphicFramePr>
+          <p:cNvPr id="7" name="Object 6">
+            <a:extLst>
+              <a:ext uri="{FF2B5EF4-FFF2-40B4-BE49-F238E27FC236}">
+                <a16:creationId xmlns:a16="http://schemas.microsoft.com/office/drawing/2014/main" id="{9B925EAF-A072-46DB-8B53-9A1EAA7A767B}"/>
+              </a:ext>
+            </a:extLst>
+          </p:cNvPr>
+          <p:cNvGraphicFramePr>
+            <a:graphicFrameLocks noChangeAspect="1"/>
+          </p:cNvGraphicFramePr>
+          <p:nvPr>
+            <p:extLst>
+              <p:ext uri="{D42A27DB-BD31-4B8C-83A1-F6EECF244321}">
+                <p14:modId xmlns:p14="http://schemas.microsoft.com/office/powerpoint/2010/main" val="2014298362"/>
+              </p:ext>
+            </p:extLst>
+          </p:nvPr>
+        </p:nvGraphicFramePr>
+        <p:xfrm>
+          <a:off x="4049033" y="0"/>
+          <a:ext cx="4391025" cy="3276600"/>
+        </p:xfrm>
+        <a:graphic>
+          <a:graphicData uri="http://schemas.openxmlformats.org/presentationml/2006/ole">
+            <mc:AlternateContent xmlns:mc="http://schemas.openxmlformats.org/markup-compatibility/2006">
+              <mc:Choice xmlns:v="urn:schemas-microsoft-com:vml" Requires="v">
+                <p:oleObj spid="_x0000_s3106" name="Acrobat Document" r:id="rId5" imgW="4390885" imgH="3276600" progId="AcroExch.Document.DC">
+                  <p:embed/>
+                </p:oleObj>
+              </mc:Choice>
+              <mc:Fallback>
+                <p:oleObj name="Acrobat Document" r:id="rId5" imgW="4390885" imgH="3276600" progId="AcroExch.Document.DC">
+                  <p:embed/>
+                  <p:pic>
+                    <p:nvPicPr>
+                      <p:cNvPr id="0" name=""/>
+                      <p:cNvPicPr/>
+                      <p:nvPr/>
+                    </p:nvPicPr>
+                    <p:blipFill>
+                      <a:blip r:embed="rId6"/>
+                      <a:stretch>
+                        <a:fillRect/>
+                      </a:stretch>
+                    </p:blipFill>
+                    <p:spPr>
+                      <a:xfrm>
+                        <a:off x="4049033" y="0"/>
+                        <a:ext cx="4391025" cy="3276600"/>
+                      </a:xfrm>
+                      <a:prstGeom prst="rect">
+                        <a:avLst/>
+                      </a:prstGeom>
+                    </p:spPr>
+                  </p:pic>
+                </p:oleObj>
+              </mc:Fallback>
+            </mc:AlternateContent>
+          </a:graphicData>
+        </a:graphic>
+      </p:graphicFrame>
+      <p:graphicFrame>
+        <p:nvGraphicFramePr>
+          <p:cNvPr id="8" name="Object 7">
+            <a:extLst>
+              <a:ext uri="{FF2B5EF4-FFF2-40B4-BE49-F238E27FC236}">
+                <a16:creationId xmlns:a16="http://schemas.microsoft.com/office/drawing/2014/main" id="{F74EB161-37C7-4376-BC65-A49A728B0D37}"/>
+              </a:ext>
+            </a:extLst>
+          </p:cNvPr>
+          <p:cNvGraphicFramePr>
+            <a:graphicFrameLocks noChangeAspect="1"/>
+          </p:cNvGraphicFramePr>
+          <p:nvPr>
+            <p:extLst>
+              <p:ext uri="{D42A27DB-BD31-4B8C-83A1-F6EECF244321}">
+                <p14:modId xmlns:p14="http://schemas.microsoft.com/office/powerpoint/2010/main" val="4170530991"/>
+              </p:ext>
+            </p:extLst>
+          </p:nvPr>
+        </p:nvGraphicFramePr>
+        <p:xfrm>
+          <a:off x="0" y="3429000"/>
+          <a:ext cx="4391025" cy="3276600"/>
+        </p:xfrm>
+        <a:graphic>
+          <a:graphicData uri="http://schemas.openxmlformats.org/presentationml/2006/ole">
+            <mc:AlternateContent xmlns:mc="http://schemas.openxmlformats.org/markup-compatibility/2006">
+              <mc:Choice xmlns:v="urn:schemas-microsoft-com:vml" Requires="v">
+                <p:oleObj spid="_x0000_s3107" name="Acrobat Document" r:id="rId7" imgW="4390885" imgH="3276600" progId="AcroExch.Document.DC">
+                  <p:embed/>
+                </p:oleObj>
+              </mc:Choice>
+              <mc:Fallback>
+                <p:oleObj name="Acrobat Document" r:id="rId7" imgW="4390885" imgH="3276600" progId="AcroExch.Document.DC">
+                  <p:embed/>
+                  <p:pic>
+                    <p:nvPicPr>
+                      <p:cNvPr id="2" name="Object 1">
+                        <a:extLst>
+                          <a:ext uri="{FF2B5EF4-FFF2-40B4-BE49-F238E27FC236}">
+                            <a16:creationId xmlns:a16="http://schemas.microsoft.com/office/drawing/2014/main" id="{EE79D353-B65F-4B4D-81EB-B1F7952B9FF4}"/>
+                          </a:ext>
+                        </a:extLst>
+                      </p:cNvPr>
+                      <p:cNvPicPr/>
+                      <p:nvPr/>
+                    </p:nvPicPr>
+                    <p:blipFill>
+                      <a:blip r:embed="rId8"/>
+                      <a:stretch>
+                        <a:fillRect/>
+                      </a:stretch>
+                    </p:blipFill>
+                    <p:spPr>
+                      <a:xfrm>
+                        <a:off x="0" y="3429000"/>
+                        <a:ext cx="4391025" cy="3276600"/>
+                      </a:xfrm>
+                      <a:prstGeom prst="rect">
+                        <a:avLst/>
+                      </a:prstGeom>
+                    </p:spPr>
+                  </p:pic>
+                </p:oleObj>
+              </mc:Fallback>
+            </mc:AlternateContent>
+          </a:graphicData>
+        </a:graphic>
+      </p:graphicFrame>
+      <p:graphicFrame>
+        <p:nvGraphicFramePr>
+          <p:cNvPr id="9" name="Object 8">
+            <a:extLst>
+              <a:ext uri="{FF2B5EF4-FFF2-40B4-BE49-F238E27FC236}">
+                <a16:creationId xmlns:a16="http://schemas.microsoft.com/office/drawing/2014/main" id="{CA04F5C7-2B18-4F25-BA82-5C657B7931C5}"/>
+              </a:ext>
+            </a:extLst>
+          </p:cNvPr>
+          <p:cNvGraphicFramePr>
+            <a:graphicFrameLocks noChangeAspect="1"/>
+          </p:cNvGraphicFramePr>
+          <p:nvPr>
+            <p:extLst>
+              <p:ext uri="{D42A27DB-BD31-4B8C-83A1-F6EECF244321}">
+                <p14:modId xmlns:p14="http://schemas.microsoft.com/office/powerpoint/2010/main" val="3378279287"/>
+              </p:ext>
+            </p:extLst>
+          </p:nvPr>
+        </p:nvGraphicFramePr>
+        <p:xfrm>
+          <a:off x="4049032" y="3429000"/>
+          <a:ext cx="4391025" cy="3276600"/>
+        </p:xfrm>
+        <a:graphic>
+          <a:graphicData uri="http://schemas.openxmlformats.org/presentationml/2006/ole">
+            <mc:AlternateContent xmlns:mc="http://schemas.openxmlformats.org/markup-compatibility/2006">
+              <mc:Choice xmlns:v="urn:schemas-microsoft-com:vml" Requires="v">
+                <p:oleObj spid="_x0000_s3108" name="Acrobat Document" r:id="rId9" imgW="4390885" imgH="3276600" progId="AcroExch.Document.DC">
+                  <p:embed/>
+                </p:oleObj>
+              </mc:Choice>
+              <mc:Fallback>
+                <p:oleObj name="Acrobat Document" r:id="rId9" imgW="4390885" imgH="3276600" progId="AcroExch.Document.DC">
+                  <p:embed/>
+                  <p:pic>
+                    <p:nvPicPr>
+                      <p:cNvPr id="3" name="Object 2">
+                        <a:extLst>
+                          <a:ext uri="{FF2B5EF4-FFF2-40B4-BE49-F238E27FC236}">
+                            <a16:creationId xmlns:a16="http://schemas.microsoft.com/office/drawing/2014/main" id="{56E6FA22-D449-4E28-BA41-930DD603A2DB}"/>
+                          </a:ext>
+                        </a:extLst>
+                      </p:cNvPr>
+                      <p:cNvPicPr/>
+                      <p:nvPr/>
+                    </p:nvPicPr>
+                    <p:blipFill>
+                      <a:blip r:embed="rId10"/>
+                      <a:stretch>
+                        <a:fillRect/>
+                      </a:stretch>
+                    </p:blipFill>
+                    <p:spPr>
+                      <a:xfrm>
+                        <a:off x="4049032" y="3429000"/>
+                        <a:ext cx="4391025" cy="3276600"/>
+                      </a:xfrm>
+                      <a:prstGeom prst="rect">
+                        <a:avLst/>
+                      </a:prstGeom>
+                    </p:spPr>
+                  </p:pic>
+                </p:oleObj>
+              </mc:Fallback>
+            </mc:AlternateContent>
+          </a:graphicData>
+        </a:graphic>
+      </p:graphicFrame>
+      <p:graphicFrame>
+        <p:nvGraphicFramePr>
+          <p:cNvPr id="10" name="Object 9">
+            <a:extLst>
+              <a:ext uri="{FF2B5EF4-FFF2-40B4-BE49-F238E27FC236}">
+                <a16:creationId xmlns:a16="http://schemas.microsoft.com/office/drawing/2014/main" id="{750584CF-69B3-42EA-9AE1-7F5B001B4F96}"/>
+              </a:ext>
+            </a:extLst>
+          </p:cNvPr>
+          <p:cNvGraphicFramePr>
+            <a:graphicFrameLocks noChangeAspect="1"/>
+          </p:cNvGraphicFramePr>
+          <p:nvPr>
+            <p:extLst>
+              <p:ext uri="{D42A27DB-BD31-4B8C-83A1-F6EECF244321}">
+                <p14:modId xmlns:p14="http://schemas.microsoft.com/office/powerpoint/2010/main" val="3933589301"/>
+              </p:ext>
+            </p:extLst>
+          </p:nvPr>
+        </p:nvGraphicFramePr>
+        <p:xfrm>
+          <a:off x="8098066" y="0"/>
+          <a:ext cx="4391025" cy="3276600"/>
+        </p:xfrm>
+        <a:graphic>
+          <a:graphicData uri="http://schemas.openxmlformats.org/presentationml/2006/ole">
+            <mc:AlternateContent xmlns:mc="http://schemas.openxmlformats.org/markup-compatibility/2006">
+              <mc:Choice xmlns:v="urn:schemas-microsoft-com:vml" Requires="v">
+                <p:oleObj spid="_x0000_s3109" name="Acrobat Document" r:id="rId11" imgW="4390885" imgH="3276600" progId="AcroExch.Document.DC">
+                  <p:embed/>
+                </p:oleObj>
+              </mc:Choice>
+              <mc:Fallback>
+                <p:oleObj name="Acrobat Document" r:id="rId11" imgW="4390885" imgH="3276600" progId="AcroExch.Document.DC">
+                  <p:embed/>
+                  <p:pic>
+                    <p:nvPicPr>
+                      <p:cNvPr id="0" name=""/>
+                      <p:cNvPicPr/>
+                      <p:nvPr/>
+                    </p:nvPicPr>
+                    <p:blipFill>
+                      <a:blip r:embed="rId12"/>
+                      <a:stretch>
+                        <a:fillRect/>
+                      </a:stretch>
+                    </p:blipFill>
+                    <p:spPr>
+                      <a:xfrm>
+                        <a:off x="8098066" y="0"/>
+                        <a:ext cx="4391025" cy="3276600"/>
+                      </a:xfrm>
+                      <a:prstGeom prst="rect">
+                        <a:avLst/>
+                      </a:prstGeom>
+                    </p:spPr>
+                  </p:pic>
+                </p:oleObj>
+              </mc:Fallback>
+            </mc:AlternateContent>
+          </a:graphicData>
+        </a:graphic>
+      </p:graphicFrame>
+      <p:graphicFrame>
+        <p:nvGraphicFramePr>
+          <p:cNvPr id="11" name="Object 10">
+            <a:extLst>
+              <a:ext uri="{FF2B5EF4-FFF2-40B4-BE49-F238E27FC236}">
+                <a16:creationId xmlns:a16="http://schemas.microsoft.com/office/drawing/2014/main" id="{C0BC3BEC-21AA-4CC8-9840-05E6A446477E}"/>
+              </a:ext>
+            </a:extLst>
+          </p:cNvPr>
+          <p:cNvGraphicFramePr>
+            <a:graphicFrameLocks noChangeAspect="1"/>
+          </p:cNvGraphicFramePr>
+          <p:nvPr>
+            <p:extLst>
+              <p:ext uri="{D42A27DB-BD31-4B8C-83A1-F6EECF244321}">
+                <p14:modId xmlns:p14="http://schemas.microsoft.com/office/powerpoint/2010/main" val="1843088442"/>
+              </p:ext>
+            </p:extLst>
+          </p:nvPr>
+        </p:nvGraphicFramePr>
+        <p:xfrm>
+          <a:off x="8098064" y="3429000"/>
+          <a:ext cx="4391025" cy="3276600"/>
+        </p:xfrm>
+        <a:graphic>
+          <a:graphicData uri="http://schemas.openxmlformats.org/presentationml/2006/ole">
+            <mc:AlternateContent xmlns:mc="http://schemas.openxmlformats.org/markup-compatibility/2006">
+              <mc:Choice xmlns:v="urn:schemas-microsoft-com:vml" Requires="v">
+                <p:oleObj spid="_x0000_s3110" name="Acrobat Document" r:id="rId13" imgW="4390885" imgH="3276600" progId="AcroExch.Document.DC">
+                  <p:embed/>
+                </p:oleObj>
+              </mc:Choice>
+              <mc:Fallback>
+                <p:oleObj name="Acrobat Document" r:id="rId13" imgW="4390885" imgH="3276600" progId="AcroExch.Document.DC">
+                  <p:embed/>
+                  <p:pic>
+                    <p:nvPicPr>
+                      <p:cNvPr id="0" name=""/>
+                      <p:cNvPicPr/>
+                      <p:nvPr/>
+                    </p:nvPicPr>
+                    <p:blipFill>
+                      <a:blip r:embed="rId14"/>
+                      <a:stretch>
+                        <a:fillRect/>
+                      </a:stretch>
+                    </p:blipFill>
+                    <p:spPr>
+                      <a:xfrm>
+                        <a:off x="8098064" y="3429000"/>
+                        <a:ext cx="4391025" cy="3276600"/>
+                      </a:xfrm>
+                      <a:prstGeom prst="rect">
+                        <a:avLst/>
+                      </a:prstGeom>
+                    </p:spPr>
+                  </p:pic>
+                </p:oleObj>
+              </mc:Fallback>
+            </mc:AlternateContent>
+          </a:graphicData>
+        </a:graphic>
+      </p:graphicFrame>
+    </p:spTree>
+    <p:extLst>
+      <p:ext uri="{BB962C8B-B14F-4D97-AF65-F5344CB8AC3E}">
+        <p14:creationId xmlns:p14="http://schemas.microsoft.com/office/powerpoint/2010/main" val="3462444782"/>
+      </p:ext>
+    </p:extLst>
+  </p:cSld>
+  <p:clrMapOvr>
+    <a:masterClrMapping/>
+  </p:clrMapOvr>
+</p:sld>
+</file>
+
+<file path=ppt/slides/slide6.xml><?xml version="1.0" encoding="utf-8"?>
+<p:sld xmlns:a="http://schemas.openxmlformats.org/drawingml/2006/main" xmlns:r="http://schemas.openxmlformats.org/officeDocument/2006/relationships" xmlns:p="http://schemas.openxmlformats.org/presentationml/2006/main">
+  <p:cSld>
+    <p:spTree>
+      <p:nvGrpSpPr>
+        <p:cNvPr id="1" name=""/>
+        <p:cNvGrpSpPr/>
+        <p:nvPr/>
+      </p:nvGrpSpPr>
+      <p:grpSpPr>
+        <a:xfrm>
+          <a:off x="0" y="0"/>
+          <a:ext cx="0" cy="0"/>
+          <a:chOff x="0" y="0"/>
+          <a:chExt cx="0" cy="0"/>
+        </a:xfrm>
+      </p:grpSpPr>
+      <p:graphicFrame>
+        <p:nvGraphicFramePr>
+          <p:cNvPr id="4" name="Object 3">
+            <a:extLst>
+              <a:ext uri="{FF2B5EF4-FFF2-40B4-BE49-F238E27FC236}">
+                <a16:creationId xmlns:a16="http://schemas.microsoft.com/office/drawing/2014/main" id="{E114CE32-2454-43F9-885C-D5E83E4AFBAE}"/>
+              </a:ext>
+            </a:extLst>
+          </p:cNvPr>
+          <p:cNvGraphicFramePr>
+            <a:graphicFrameLocks noChangeAspect="1"/>
+          </p:cNvGraphicFramePr>
+          <p:nvPr>
+            <p:extLst>
+              <p:ext uri="{D42A27DB-BD31-4B8C-83A1-F6EECF244321}">
+                <p14:modId xmlns:p14="http://schemas.microsoft.com/office/powerpoint/2010/main" val="1130593430"/>
+              </p:ext>
+            </p:extLst>
+          </p:nvPr>
+        </p:nvGraphicFramePr>
+        <p:xfrm>
+          <a:off x="3900487" y="0"/>
+          <a:ext cx="4391025" cy="3276600"/>
+        </p:xfrm>
+        <a:graphic>
+          <a:graphicData uri="http://schemas.openxmlformats.org/presentationml/2006/ole">
+            <mc:AlternateContent xmlns:mc="http://schemas.openxmlformats.org/markup-compatibility/2006">
+              <mc:Choice xmlns:v="urn:schemas-microsoft-com:vml" Requires="v">
+                <p:oleObj spid="_x0000_s4111" name="Acrobat Document" r:id="rId3" imgW="4390885" imgH="3276600" progId="AcroExch.Document.DC">
+                  <p:embed/>
+                </p:oleObj>
+              </mc:Choice>
+              <mc:Fallback>
+                <p:oleObj name="Acrobat Document" r:id="rId3" imgW="4390885" imgH="3276600" progId="AcroExch.Document.DC">
+                  <p:embed/>
+                  <p:pic>
+                    <p:nvPicPr>
+                      <p:cNvPr id="0" name=""/>
+                      <p:cNvPicPr/>
+                      <p:nvPr/>
+                    </p:nvPicPr>
+                    <p:blipFill>
+                      <a:blip r:embed="rId4"/>
+                      <a:stretch>
+                        <a:fillRect/>
+                      </a:stretch>
+                    </p:blipFill>
+                    <p:spPr>
+                      <a:xfrm>
+                        <a:off x="3900487" y="0"/>
+                        <a:ext cx="4391025" cy="3276600"/>
+                      </a:xfrm>
+                      <a:prstGeom prst="rect">
+                        <a:avLst/>
+                      </a:prstGeom>
+                    </p:spPr>
+                  </p:pic>
+                </p:oleObj>
+              </mc:Fallback>
+            </mc:AlternateContent>
+          </a:graphicData>
+        </a:graphic>
+      </p:graphicFrame>
+      <p:graphicFrame>
+        <p:nvGraphicFramePr>
+          <p:cNvPr id="5" name="Object 4">
+            <a:extLst>
+              <a:ext uri="{FF2B5EF4-FFF2-40B4-BE49-F238E27FC236}">
+                <a16:creationId xmlns:a16="http://schemas.microsoft.com/office/drawing/2014/main" id="{5FD088FD-AF2F-4657-8A17-646E5EA0EA18}"/>
+              </a:ext>
+            </a:extLst>
+          </p:cNvPr>
+          <p:cNvGraphicFramePr>
+            <a:graphicFrameLocks noChangeAspect="1"/>
+          </p:cNvGraphicFramePr>
+          <p:nvPr>
+            <p:extLst>
+              <p:ext uri="{D42A27DB-BD31-4B8C-83A1-F6EECF244321}">
+                <p14:modId xmlns:p14="http://schemas.microsoft.com/office/powerpoint/2010/main" val="3085375244"/>
+              </p:ext>
+            </p:extLst>
+          </p:nvPr>
+        </p:nvGraphicFramePr>
+        <p:xfrm>
+          <a:off x="7968116" y="0"/>
+          <a:ext cx="4391025" cy="3276600"/>
+        </p:xfrm>
+        <a:graphic>
+          <a:graphicData uri="http://schemas.openxmlformats.org/presentationml/2006/ole">
+            <mc:AlternateContent xmlns:mc="http://schemas.openxmlformats.org/markup-compatibility/2006">
+              <mc:Choice xmlns:v="urn:schemas-microsoft-com:vml" Requires="v">
+                <p:oleObj spid="_x0000_s4112" name="Acrobat Document" r:id="rId5" imgW="4390885" imgH="3276600" progId="AcroExch.Document.DC">
+                  <p:embed/>
+                </p:oleObj>
+              </mc:Choice>
+              <mc:Fallback>
+                <p:oleObj name="Acrobat Document" r:id="rId5" imgW="4390885" imgH="3276600" progId="AcroExch.Document.DC">
+                  <p:embed/>
+                  <p:pic>
+                    <p:nvPicPr>
+                      <p:cNvPr id="0" name=""/>
+                      <p:cNvPicPr/>
+                      <p:nvPr/>
+                    </p:nvPicPr>
+                    <p:blipFill>
+                      <a:blip r:embed="rId6"/>
+                      <a:stretch>
+                        <a:fillRect/>
+                      </a:stretch>
+                    </p:blipFill>
+                    <p:spPr>
+                      <a:xfrm>
+                        <a:off x="7968116" y="0"/>
+                        <a:ext cx="4391025" cy="3276600"/>
+                      </a:xfrm>
+                      <a:prstGeom prst="rect">
+                        <a:avLst/>
+                      </a:prstGeom>
+                    </p:spPr>
+                  </p:pic>
+                </p:oleObj>
+              </mc:Fallback>
+            </mc:AlternateContent>
+          </a:graphicData>
+        </a:graphic>
+      </p:graphicFrame>
+    </p:spTree>
+    <p:extLst>
+      <p:ext uri="{BB962C8B-B14F-4D97-AF65-F5344CB8AC3E}">
+        <p14:creationId xmlns:p14="http://schemas.microsoft.com/office/powerpoint/2010/main" val="1792971804"/>
+      </p:ext>
+    </p:extLst>
+  </p:cSld>
+  <p:clrMapOvr>
+    <a:masterClrMapping/>
+  </p:clrMapOvr>
+</p:sld>
+</file>
+
+<file path=ppt/slides/slide7.xml><?xml version="1.0" encoding="utf-8"?>
+<p:sld xmlns:a="http://schemas.openxmlformats.org/drawingml/2006/main" xmlns:r="http://schemas.openxmlformats.org/officeDocument/2006/relationships" xmlns:p="http://schemas.openxmlformats.org/presentationml/2006/main">
+  <p:cSld>
+    <p:spTree>
+      <p:nvGrpSpPr>
+        <p:cNvPr id="1" name=""/>
+        <p:cNvGrpSpPr/>
+        <p:nvPr/>
+      </p:nvGrpSpPr>
+      <p:grpSpPr>
+        <a:xfrm>
+          <a:off x="0" y="0"/>
+          <a:ext cx="0" cy="0"/>
+          <a:chOff x="0" y="0"/>
+          <a:chExt cx="0" cy="0"/>
+        </a:xfrm>
+      </p:grpSpPr>
+      <p:graphicFrame>
+        <p:nvGraphicFramePr>
           <p:cNvPr id="2" name="Object 1">
             <a:extLst>
               <a:ext uri="{FF2B5EF4-FFF2-40B4-BE49-F238E27FC236}">
@@ -4796,7 +5641,7 @@
           <a:graphicData uri="http://schemas.openxmlformats.org/presentationml/2006/ole">
             <mc:AlternateContent xmlns:mc="http://schemas.openxmlformats.org/markup-compatibility/2006">
               <mc:Choice xmlns:v="urn:schemas-microsoft-com:vml" Requires="v">
-                <p:oleObj spid="_x0000_s5122" name="Acrobat Document" r:id="rId3" imgW="10239162" imgH="7267575" progId="AcroExch.Document.DC">
+                <p:oleObj spid="_x0000_s5124" name="Acrobat Document" r:id="rId3" imgW="10239162" imgH="7267575" progId="AcroExch.Document.DC">
                   <p:embed/>
                 </p:oleObj>
               </mc:Choice>
@@ -4835,6 +5680,99 @@
     <p:extLst>
       <p:ext uri="{BB962C8B-B14F-4D97-AF65-F5344CB8AC3E}">
         <p14:creationId xmlns:p14="http://schemas.microsoft.com/office/powerpoint/2010/main" val="3497222250"/>
+      </p:ext>
+    </p:extLst>
+  </p:cSld>
+  <p:clrMapOvr>
+    <a:masterClrMapping/>
+  </p:clrMapOvr>
+</p:sld>
+</file>
+
+<file path=ppt/slides/slide8.xml><?xml version="1.0" encoding="utf-8"?>
+<p:sld xmlns:a="http://schemas.openxmlformats.org/drawingml/2006/main" xmlns:r="http://schemas.openxmlformats.org/officeDocument/2006/relationships" xmlns:p="http://schemas.openxmlformats.org/presentationml/2006/main">
+  <p:cSld>
+    <p:spTree>
+      <p:nvGrpSpPr>
+        <p:cNvPr id="1" name=""/>
+        <p:cNvGrpSpPr/>
+        <p:nvPr/>
+      </p:nvGrpSpPr>
+      <p:grpSpPr>
+        <a:xfrm>
+          <a:off x="0" y="0"/>
+          <a:ext cx="0" cy="0"/>
+          <a:chOff x="0" y="0"/>
+          <a:chExt cx="0" cy="0"/>
+        </a:xfrm>
+      </p:grpSpPr>
+      <p:graphicFrame>
+        <p:nvGraphicFramePr>
+          <p:cNvPr id="2" name="Object 1">
+            <a:extLst>
+              <a:ext uri="{FF2B5EF4-FFF2-40B4-BE49-F238E27FC236}">
+                <a16:creationId xmlns:a16="http://schemas.microsoft.com/office/drawing/2014/main" id="{372DCCEF-A20E-4976-94CE-B740631C49FD}"/>
+              </a:ext>
+            </a:extLst>
+          </p:cNvPr>
+          <p:cNvGraphicFramePr>
+            <a:graphicFrameLocks noChangeAspect="1"/>
+          </p:cNvGraphicFramePr>
+          <p:nvPr>
+            <p:extLst>
+              <p:ext uri="{D42A27DB-BD31-4B8C-83A1-F6EECF244321}">
+                <p14:modId xmlns:p14="http://schemas.microsoft.com/office/powerpoint/2010/main" val="1872296786"/>
+              </p:ext>
+            </p:extLst>
+          </p:nvPr>
+        </p:nvGraphicFramePr>
+        <p:xfrm>
+          <a:off x="1422191" y="0"/>
+          <a:ext cx="9347617" cy="6858000"/>
+        </p:xfrm>
+        <a:graphic>
+          <a:graphicData uri="http://schemas.openxmlformats.org/presentationml/2006/ole">
+            <mc:AlternateContent xmlns:mc="http://schemas.openxmlformats.org/markup-compatibility/2006">
+              <mc:Choice xmlns:v="urn:schemas-microsoft-com:vml" Requires="v">
+                <p:oleObj spid="_x0000_s9218" name="Acrobat Document" r:id="rId3" imgW="9905882" imgH="7267575" progId="AcroExch.Document.DC">
+                  <p:embed/>
+                </p:oleObj>
+              </mc:Choice>
+              <mc:Fallback>
+                <p:oleObj name="Acrobat Document" r:id="rId3" imgW="9905882" imgH="7267575" progId="AcroExch.Document.DC">
+                  <p:embed/>
+                  <p:pic>
+                    <p:nvPicPr>
+                      <p:cNvPr id="0" name=""/>
+                      <p:cNvPicPr/>
+                      <p:nvPr/>
+                    </p:nvPicPr>
+                    <p:blipFill>
+                      <a:blip r:embed="rId4"/>
+                      <a:stretch>
+                        <a:fillRect/>
+                      </a:stretch>
+                    </p:blipFill>
+                    <p:spPr>
+                      <a:xfrm>
+                        <a:off x="1422191" y="0"/>
+                        <a:ext cx="9347617" cy="6858000"/>
+                      </a:xfrm>
+                      <a:prstGeom prst="rect">
+                        <a:avLst/>
+                      </a:prstGeom>
+                    </p:spPr>
+                  </p:pic>
+                </p:oleObj>
+              </mc:Fallback>
+            </mc:AlternateContent>
+          </a:graphicData>
+        </a:graphic>
+      </p:graphicFrame>
+    </p:spTree>
+    <p:extLst>
+      <p:ext uri="{BB962C8B-B14F-4D97-AF65-F5344CB8AC3E}">
+        <p14:creationId xmlns:p14="http://schemas.microsoft.com/office/powerpoint/2010/main" val="641230405"/>
       </p:ext>
     </p:extLst>
   </p:cSld>

</xml_diff>